<commit_message>
Enhanced the image of the interaction loop
</commit_message>
<xml_diff>
--- a/bachelor-thesis/resources/interaction-loop.pptx
+++ b/bachelor-thesis/resources/interaction-loop.pptx
@@ -108,167 +108,85 @@
 </file>
 
 <file path=ppt/diagrams/colors1.xml><?xml version="1.0" encoding="utf-8"?>
-<dgm:colorsDef xmlns:dgm="http://schemas.openxmlformats.org/drawingml/2006/diagram" xmlns:a="http://schemas.openxmlformats.org/drawingml/2006/main" uniqueId="urn:microsoft.com/office/officeart/2005/8/colors/accent1_2">
+<dgm:colorsDef xmlns:dgm="http://schemas.openxmlformats.org/drawingml/2006/diagram" xmlns:a="http://schemas.openxmlformats.org/drawingml/2006/main" uniqueId="urn:microsoft.com/office/officeart/2005/8/colors/accent0_1">
   <dgm:title val=""/>
   <dgm:desc val=""/>
   <dgm:catLst>
-    <dgm:cat type="accent1" pri="11200"/>
+    <dgm:cat type="mainScheme" pri="10100"/>
   </dgm:catLst>
   <dgm:styleLbl name="node0">
     <dgm:fillClrLst meth="repeat">
-      <a:schemeClr val="accent1"/>
+      <a:schemeClr val="lt1"/>
     </dgm:fillClrLst>
     <dgm:linClrLst meth="repeat">
-      <a:schemeClr val="lt1"/>
+      <a:schemeClr val="dk1">
+        <a:shade val="80000"/>
+      </a:schemeClr>
     </dgm:linClrLst>
     <dgm:effectClrLst/>
     <dgm:txLinClrLst/>
-    <dgm:txFillClrLst/>
+    <dgm:txFillClrLst meth="repeat">
+      <a:schemeClr val="dk1"/>
+    </dgm:txFillClrLst>
     <dgm:txEffectClrLst/>
   </dgm:styleLbl>
-  <dgm:styleLbl name="alignNode1">
+  <dgm:styleLbl name="node1">
     <dgm:fillClrLst meth="repeat">
-      <a:schemeClr val="accent1"/>
+      <a:schemeClr val="lt1"/>
     </dgm:fillClrLst>
     <dgm:linClrLst meth="repeat">
-      <a:schemeClr val="accent1"/>
+      <a:schemeClr val="dk1">
+        <a:shade val="80000"/>
+      </a:schemeClr>
     </dgm:linClrLst>
     <dgm:effectClrLst/>
     <dgm:txLinClrLst/>
-    <dgm:txFillClrLst/>
+    <dgm:txFillClrLst meth="repeat">
+      <a:schemeClr val="dk1"/>
+    </dgm:txFillClrLst>
     <dgm:txEffectClrLst/>
   </dgm:styleLbl>
-  <dgm:styleLbl name="node1">
+  <dgm:styleLbl name="alignNode1">
     <dgm:fillClrLst meth="repeat">
-      <a:schemeClr val="accent1"/>
+      <a:schemeClr val="lt1"/>
     </dgm:fillClrLst>
     <dgm:linClrLst meth="repeat">
-      <a:schemeClr val="lt1"/>
+      <a:schemeClr val="dk1">
+        <a:shade val="80000"/>
+      </a:schemeClr>
     </dgm:linClrLst>
     <dgm:effectClrLst/>
     <dgm:txLinClrLst/>
-    <dgm:txFillClrLst/>
+    <dgm:txFillClrLst meth="repeat">
+      <a:schemeClr val="dk1"/>
+    </dgm:txFillClrLst>
     <dgm:txEffectClrLst/>
   </dgm:styleLbl>
   <dgm:styleLbl name="lnNode1">
     <dgm:fillClrLst meth="repeat">
-      <a:schemeClr val="accent1"/>
+      <a:schemeClr val="lt1"/>
     </dgm:fillClrLst>
     <dgm:linClrLst meth="repeat">
-      <a:schemeClr val="lt1"/>
+      <a:schemeClr val="dk1">
+        <a:shade val="80000"/>
+      </a:schemeClr>
     </dgm:linClrLst>
     <dgm:effectClrLst/>
     <dgm:txLinClrLst/>
-    <dgm:txFillClrLst/>
+    <dgm:txFillClrLst meth="repeat">
+      <a:schemeClr val="dk1"/>
+    </dgm:txFillClrLst>
     <dgm:txEffectClrLst/>
   </dgm:styleLbl>
   <dgm:styleLbl name="vennNode1">
     <dgm:fillClrLst meth="repeat">
-      <a:schemeClr val="accent1">
+      <a:schemeClr val="lt1">
         <a:alpha val="50000"/>
       </a:schemeClr>
     </dgm:fillClrLst>
     <dgm:linClrLst meth="repeat">
-      <a:schemeClr val="lt1"/>
-    </dgm:linClrLst>
-    <dgm:effectClrLst/>
-    <dgm:txLinClrLst/>
-    <dgm:txFillClrLst/>
-    <dgm:txEffectClrLst/>
-  </dgm:styleLbl>
-  <dgm:styleLbl name="node2">
-    <dgm:fillClrLst meth="repeat">
-      <a:schemeClr val="accent1"/>
-    </dgm:fillClrLst>
-    <dgm:linClrLst meth="repeat">
-      <a:schemeClr val="lt1"/>
-    </dgm:linClrLst>
-    <dgm:effectClrLst/>
-    <dgm:txLinClrLst/>
-    <dgm:txFillClrLst/>
-    <dgm:txEffectClrLst/>
-  </dgm:styleLbl>
-  <dgm:styleLbl name="node3">
-    <dgm:fillClrLst meth="repeat">
-      <a:schemeClr val="accent1"/>
-    </dgm:fillClrLst>
-    <dgm:linClrLst meth="repeat">
-      <a:schemeClr val="lt1"/>
-    </dgm:linClrLst>
-    <dgm:effectClrLst/>
-    <dgm:txLinClrLst/>
-    <dgm:txFillClrLst/>
-    <dgm:txEffectClrLst/>
-  </dgm:styleLbl>
-  <dgm:styleLbl name="node4">
-    <dgm:fillClrLst meth="repeat">
-      <a:schemeClr val="accent1"/>
-    </dgm:fillClrLst>
-    <dgm:linClrLst meth="repeat">
-      <a:schemeClr val="lt1"/>
-    </dgm:linClrLst>
-    <dgm:effectClrLst/>
-    <dgm:txLinClrLst/>
-    <dgm:txFillClrLst/>
-    <dgm:txEffectClrLst/>
-  </dgm:styleLbl>
-  <dgm:styleLbl name="fgImgPlace1">
-    <dgm:fillClrLst meth="repeat">
-      <a:schemeClr val="accent1">
-        <a:tint val="50000"/>
-      </a:schemeClr>
-    </dgm:fillClrLst>
-    <dgm:linClrLst meth="repeat">
-      <a:schemeClr val="lt1"/>
-    </dgm:linClrLst>
-    <dgm:effectClrLst/>
-    <dgm:txLinClrLst/>
-    <dgm:txFillClrLst meth="repeat">
-      <a:schemeClr val="lt1"/>
-    </dgm:txFillClrLst>
-    <dgm:txEffectClrLst/>
-  </dgm:styleLbl>
-  <dgm:styleLbl name="alignImgPlace1">
-    <dgm:fillClrLst meth="repeat">
-      <a:schemeClr val="accent1">
-        <a:tint val="50000"/>
-      </a:schemeClr>
-    </dgm:fillClrLst>
-    <dgm:linClrLst meth="repeat">
-      <a:schemeClr val="lt1"/>
-    </dgm:linClrLst>
-    <dgm:effectClrLst/>
-    <dgm:txLinClrLst/>
-    <dgm:txFillClrLst meth="repeat">
-      <a:schemeClr val="lt1"/>
-    </dgm:txFillClrLst>
-    <dgm:txEffectClrLst/>
-  </dgm:styleLbl>
-  <dgm:styleLbl name="bgImgPlace1">
-    <dgm:fillClrLst meth="repeat">
-      <a:schemeClr val="accent1">
-        <a:tint val="50000"/>
-      </a:schemeClr>
-    </dgm:fillClrLst>
-    <dgm:linClrLst meth="repeat">
-      <a:schemeClr val="lt1"/>
-    </dgm:linClrLst>
-    <dgm:effectClrLst/>
-    <dgm:txLinClrLst/>
-    <dgm:txFillClrLst meth="repeat">
-      <a:schemeClr val="lt1"/>
-    </dgm:txFillClrLst>
-    <dgm:txEffectClrLst/>
-  </dgm:styleLbl>
-  <dgm:styleLbl name="sibTrans2D1">
-    <dgm:fillClrLst meth="repeat">
-      <a:schemeClr val="accent1">
-        <a:tint val="60000"/>
-      </a:schemeClr>
-    </dgm:fillClrLst>
-    <dgm:linClrLst meth="repeat">
-      <a:schemeClr val="accent1">
-        <a:tint val="60000"/>
+      <a:schemeClr val="dk1">
+        <a:shade val="80000"/>
       </a:schemeClr>
     </dgm:linClrLst>
     <dgm:effectClrLst/>
@@ -276,137 +194,63 @@
     <dgm:txFillClrLst/>
     <dgm:txEffectClrLst/>
   </dgm:styleLbl>
-  <dgm:styleLbl name="fgSibTrans2D1">
+  <dgm:styleLbl name="node2">
     <dgm:fillClrLst meth="repeat">
-      <a:schemeClr val="accent1">
-        <a:tint val="60000"/>
-      </a:schemeClr>
+      <a:schemeClr val="lt1"/>
     </dgm:fillClrLst>
     <dgm:linClrLst meth="repeat">
-      <a:schemeClr val="accent1">
-        <a:tint val="60000"/>
-      </a:schemeClr>
-    </dgm:linClrLst>
-    <dgm:effectClrLst/>
-    <dgm:txLinClrLst/>
-    <dgm:txFillClrLst/>
-    <dgm:txEffectClrLst/>
-  </dgm:styleLbl>
-  <dgm:styleLbl name="bgSibTrans2D1">
-    <dgm:fillClrLst meth="repeat">
-      <a:schemeClr val="accent1">
-        <a:tint val="60000"/>
-      </a:schemeClr>
-    </dgm:fillClrLst>
-    <dgm:linClrLst meth="repeat">
-      <a:schemeClr val="accent1">
-        <a:tint val="60000"/>
-      </a:schemeClr>
-    </dgm:linClrLst>
-    <dgm:effectClrLst/>
-    <dgm:txLinClrLst/>
-    <dgm:txFillClrLst/>
-    <dgm:txEffectClrLst/>
-  </dgm:styleLbl>
-  <dgm:styleLbl name="sibTrans1D1">
-    <dgm:fillClrLst meth="repeat">
-      <a:schemeClr val="accent1"/>
-    </dgm:fillClrLst>
-    <dgm:linClrLst meth="repeat">
-      <a:schemeClr val="accent1"/>
-    </dgm:linClrLst>
-    <dgm:effectClrLst/>
-    <dgm:txLinClrLst/>
-    <dgm:txFillClrLst meth="repeat">
-      <a:schemeClr val="tx1"/>
-    </dgm:txFillClrLst>
-    <dgm:txEffectClrLst/>
-  </dgm:styleLbl>
-  <dgm:styleLbl name="callout">
-    <dgm:fillClrLst meth="repeat">
-      <a:schemeClr val="accent1"/>
-    </dgm:fillClrLst>
-    <dgm:linClrLst meth="repeat">
-      <a:schemeClr val="accent1">
-        <a:tint val="50000"/>
+      <a:schemeClr val="dk1">
+        <a:shade val="80000"/>
       </a:schemeClr>
     </dgm:linClrLst>
     <dgm:effectClrLst/>
     <dgm:txLinClrLst/>
     <dgm:txFillClrLst meth="repeat">
-      <a:schemeClr val="tx1"/>
+      <a:schemeClr val="dk1"/>
     </dgm:txFillClrLst>
     <dgm:txEffectClrLst/>
   </dgm:styleLbl>
-  <dgm:styleLbl name="asst0">
+  <dgm:styleLbl name="node3">
     <dgm:fillClrLst meth="repeat">
-      <a:schemeClr val="accent1"/>
+      <a:schemeClr val="lt1"/>
     </dgm:fillClrLst>
     <dgm:linClrLst meth="repeat">
-      <a:schemeClr val="lt1"/>
+      <a:schemeClr val="dk1">
+        <a:shade val="80000"/>
+      </a:schemeClr>
     </dgm:linClrLst>
     <dgm:effectClrLst/>
     <dgm:txLinClrLst/>
-    <dgm:txFillClrLst/>
+    <dgm:txFillClrLst meth="repeat">
+      <a:schemeClr val="dk1"/>
+    </dgm:txFillClrLst>
     <dgm:txEffectClrLst/>
   </dgm:styleLbl>
-  <dgm:styleLbl name="asst1">
+  <dgm:styleLbl name="node4">
     <dgm:fillClrLst meth="repeat">
-      <a:schemeClr val="accent1"/>
+      <a:schemeClr val="lt1"/>
     </dgm:fillClrLst>
     <dgm:linClrLst meth="repeat">
-      <a:schemeClr val="lt1"/>
+      <a:schemeClr val="dk1">
+        <a:shade val="80000"/>
+      </a:schemeClr>
     </dgm:linClrLst>
     <dgm:effectClrLst/>
     <dgm:txLinClrLst/>
-    <dgm:txFillClrLst/>
+    <dgm:txFillClrLst meth="repeat">
+      <a:schemeClr val="dk1"/>
+    </dgm:txFillClrLst>
     <dgm:txEffectClrLst/>
   </dgm:styleLbl>
-  <dgm:styleLbl name="asst2">
+  <dgm:styleLbl name="fgImgPlace1">
     <dgm:fillClrLst meth="repeat">
-      <a:schemeClr val="accent1"/>
-    </dgm:fillClrLst>
-    <dgm:linClrLst meth="repeat">
-      <a:schemeClr val="lt1"/>
-    </dgm:linClrLst>
-    <dgm:effectClrLst/>
-    <dgm:txLinClrLst/>
-    <dgm:txFillClrLst/>
-    <dgm:txEffectClrLst/>
-  </dgm:styleLbl>
-  <dgm:styleLbl name="asst3">
-    <dgm:fillClrLst meth="repeat">
-      <a:schemeClr val="accent1"/>
-    </dgm:fillClrLst>
-    <dgm:linClrLst meth="repeat">
-      <a:schemeClr val="lt1"/>
-    </dgm:linClrLst>
-    <dgm:effectClrLst/>
-    <dgm:txLinClrLst/>
-    <dgm:txFillClrLst/>
-    <dgm:txEffectClrLst/>
-  </dgm:styleLbl>
-  <dgm:styleLbl name="asst4">
-    <dgm:fillClrLst meth="repeat">
-      <a:schemeClr val="accent1"/>
-    </dgm:fillClrLst>
-    <dgm:linClrLst meth="repeat">
-      <a:schemeClr val="lt1"/>
-    </dgm:linClrLst>
-    <dgm:effectClrLst/>
-    <dgm:txLinClrLst/>
-    <dgm:txFillClrLst/>
-    <dgm:txEffectClrLst/>
-  </dgm:styleLbl>
-  <dgm:styleLbl name="parChTrans2D1">
-    <dgm:fillClrLst meth="repeat">
-      <a:schemeClr val="accent1">
-        <a:tint val="60000"/>
+      <a:schemeClr val="dk1">
+        <a:tint val="40000"/>
       </a:schemeClr>
     </dgm:fillClrLst>
     <dgm:linClrLst meth="repeat">
-      <a:schemeClr val="accent1">
-        <a:tint val="60000"/>
+      <a:schemeClr val="dk1">
+        <a:shade val="80000"/>
       </a:schemeClr>
     </dgm:linClrLst>
     <dgm:effectClrLst/>
@@ -416,12 +260,16 @@
     </dgm:txFillClrLst>
     <dgm:txEffectClrLst/>
   </dgm:styleLbl>
-  <dgm:styleLbl name="parChTrans2D2">
+  <dgm:styleLbl name="alignImgPlace1">
     <dgm:fillClrLst meth="repeat">
-      <a:schemeClr val="accent1"/>
+      <a:schemeClr val="dk1">
+        <a:tint val="40000"/>
+      </a:schemeClr>
     </dgm:fillClrLst>
     <dgm:linClrLst meth="repeat">
-      <a:schemeClr val="accent1"/>
+      <a:schemeClr val="dk1">
+        <a:shade val="80000"/>
+      </a:schemeClr>
     </dgm:linClrLst>
     <dgm:effectClrLst/>
     <dgm:txLinClrLst/>
@@ -430,12 +278,16 @@
     </dgm:txFillClrLst>
     <dgm:txEffectClrLst/>
   </dgm:styleLbl>
-  <dgm:styleLbl name="parChTrans2D3">
+  <dgm:styleLbl name="bgImgPlace1">
     <dgm:fillClrLst meth="repeat">
-      <a:schemeClr val="accent1"/>
+      <a:schemeClr val="dk1">
+        <a:tint val="40000"/>
+      </a:schemeClr>
     </dgm:fillClrLst>
     <dgm:linClrLst meth="repeat">
-      <a:schemeClr val="accent1"/>
+      <a:schemeClr val="dk1">
+        <a:shade val="80000"/>
+      </a:schemeClr>
     </dgm:linClrLst>
     <dgm:effectClrLst/>
     <dgm:txLinClrLst/>
@@ -444,12 +296,214 @@
     </dgm:txFillClrLst>
     <dgm:txEffectClrLst/>
   </dgm:styleLbl>
+  <dgm:styleLbl name="sibTrans2D1">
+    <dgm:fillClrLst meth="repeat">
+      <a:schemeClr val="dk1">
+        <a:tint val="60000"/>
+      </a:schemeClr>
+    </dgm:fillClrLst>
+    <dgm:linClrLst meth="repeat">
+      <a:schemeClr val="dk1">
+        <a:tint val="60000"/>
+      </a:schemeClr>
+    </dgm:linClrLst>
+    <dgm:effectClrLst/>
+    <dgm:txLinClrLst/>
+    <dgm:txFillClrLst meth="repeat">
+      <a:schemeClr val="dk1"/>
+    </dgm:txFillClrLst>
+    <dgm:txEffectClrLst/>
+  </dgm:styleLbl>
+  <dgm:styleLbl name="fgSibTrans2D1">
+    <dgm:fillClrLst meth="repeat">
+      <a:schemeClr val="dk1">
+        <a:tint val="60000"/>
+      </a:schemeClr>
+    </dgm:fillClrLst>
+    <dgm:linClrLst meth="repeat">
+      <a:schemeClr val="dk1">
+        <a:tint val="60000"/>
+      </a:schemeClr>
+    </dgm:linClrLst>
+    <dgm:effectClrLst/>
+    <dgm:txLinClrLst/>
+    <dgm:txFillClrLst meth="repeat">
+      <a:schemeClr val="dk1"/>
+    </dgm:txFillClrLst>
+    <dgm:txEffectClrLst/>
+  </dgm:styleLbl>
+  <dgm:styleLbl name="bgSibTrans2D1">
+    <dgm:fillClrLst meth="repeat">
+      <a:schemeClr val="dk1">
+        <a:tint val="60000"/>
+      </a:schemeClr>
+    </dgm:fillClrLst>
+    <dgm:linClrLst meth="repeat">
+      <a:schemeClr val="dk1">
+        <a:tint val="60000"/>
+      </a:schemeClr>
+    </dgm:linClrLst>
+    <dgm:effectClrLst/>
+    <dgm:txLinClrLst/>
+    <dgm:txFillClrLst meth="repeat">
+      <a:schemeClr val="dk1"/>
+    </dgm:txFillClrLst>
+    <dgm:txEffectClrLst/>
+  </dgm:styleLbl>
+  <dgm:styleLbl name="sibTrans1D1">
+    <dgm:fillClrLst meth="repeat">
+      <a:schemeClr val="dk1"/>
+    </dgm:fillClrLst>
+    <dgm:linClrLst meth="repeat">
+      <a:schemeClr val="dk1"/>
+    </dgm:linClrLst>
+    <dgm:effectClrLst/>
+    <dgm:txLinClrLst/>
+    <dgm:txFillClrLst meth="repeat">
+      <a:schemeClr val="tx1"/>
+    </dgm:txFillClrLst>
+    <dgm:txEffectClrLst/>
+  </dgm:styleLbl>
+  <dgm:styleLbl name="callout">
+    <dgm:fillClrLst meth="repeat">
+      <a:schemeClr val="dk1"/>
+    </dgm:fillClrLst>
+    <dgm:linClrLst meth="repeat">
+      <a:schemeClr val="dk1"/>
+    </dgm:linClrLst>
+    <dgm:effectClrLst/>
+    <dgm:txLinClrLst/>
+    <dgm:txFillClrLst meth="repeat">
+      <a:schemeClr val="tx1"/>
+    </dgm:txFillClrLst>
+    <dgm:txEffectClrLst/>
+  </dgm:styleLbl>
+  <dgm:styleLbl name="asst0">
+    <dgm:fillClrLst meth="repeat">
+      <a:schemeClr val="lt1"/>
+    </dgm:fillClrLst>
+    <dgm:linClrLst meth="repeat">
+      <a:schemeClr val="dk1">
+        <a:shade val="80000"/>
+      </a:schemeClr>
+    </dgm:linClrLst>
+    <dgm:effectClrLst/>
+    <dgm:txLinClrLst/>
+    <dgm:txFillClrLst meth="repeat">
+      <a:schemeClr val="dk1"/>
+    </dgm:txFillClrLst>
+    <dgm:txEffectClrLst/>
+  </dgm:styleLbl>
+  <dgm:styleLbl name="asst1">
+    <dgm:fillClrLst meth="repeat">
+      <a:schemeClr val="lt1"/>
+    </dgm:fillClrLst>
+    <dgm:linClrLst meth="repeat">
+      <a:schemeClr val="dk1">
+        <a:shade val="80000"/>
+      </a:schemeClr>
+    </dgm:linClrLst>
+    <dgm:effectClrLst/>
+    <dgm:txLinClrLst/>
+    <dgm:txFillClrLst meth="repeat">
+      <a:schemeClr val="dk1"/>
+    </dgm:txFillClrLst>
+    <dgm:txEffectClrLst/>
+  </dgm:styleLbl>
+  <dgm:styleLbl name="asst2">
+    <dgm:fillClrLst meth="repeat">
+      <a:schemeClr val="lt1"/>
+    </dgm:fillClrLst>
+    <dgm:linClrLst meth="repeat">
+      <a:schemeClr val="dk1">
+        <a:shade val="80000"/>
+      </a:schemeClr>
+    </dgm:linClrLst>
+    <dgm:effectClrLst/>
+    <dgm:txLinClrLst/>
+    <dgm:txFillClrLst meth="repeat">
+      <a:schemeClr val="dk1"/>
+    </dgm:txFillClrLst>
+    <dgm:txEffectClrLst/>
+  </dgm:styleLbl>
+  <dgm:styleLbl name="asst3">
+    <dgm:fillClrLst meth="repeat">
+      <a:schemeClr val="lt1"/>
+    </dgm:fillClrLst>
+    <dgm:linClrLst meth="repeat">
+      <a:schemeClr val="dk1">
+        <a:shade val="80000"/>
+      </a:schemeClr>
+    </dgm:linClrLst>
+    <dgm:effectClrLst/>
+    <dgm:txLinClrLst/>
+    <dgm:txFillClrLst meth="repeat">
+      <a:schemeClr val="dk1"/>
+    </dgm:txFillClrLst>
+    <dgm:txEffectClrLst/>
+  </dgm:styleLbl>
+  <dgm:styleLbl name="asst4">
+    <dgm:fillClrLst meth="repeat">
+      <a:schemeClr val="lt1"/>
+    </dgm:fillClrLst>
+    <dgm:linClrLst meth="repeat">
+      <a:schemeClr val="dk1">
+        <a:shade val="80000"/>
+      </a:schemeClr>
+    </dgm:linClrLst>
+    <dgm:effectClrLst/>
+    <dgm:txLinClrLst/>
+    <dgm:txFillClrLst meth="repeat">
+      <a:schemeClr val="dk1"/>
+    </dgm:txFillClrLst>
+    <dgm:txEffectClrLst/>
+  </dgm:styleLbl>
+  <dgm:styleLbl name="parChTrans2D1">
+    <dgm:fillClrLst meth="repeat">
+      <a:schemeClr val="dk1">
+        <a:tint val="60000"/>
+      </a:schemeClr>
+    </dgm:fillClrLst>
+    <dgm:linClrLst meth="repeat">
+      <a:schemeClr val="dk1">
+        <a:tint val="60000"/>
+      </a:schemeClr>
+    </dgm:linClrLst>
+    <dgm:effectClrLst/>
+    <dgm:txLinClrLst/>
+    <dgm:txFillClrLst/>
+    <dgm:txEffectClrLst/>
+  </dgm:styleLbl>
+  <dgm:styleLbl name="parChTrans2D2">
+    <dgm:fillClrLst meth="repeat">
+      <a:schemeClr val="dk1"/>
+    </dgm:fillClrLst>
+    <dgm:linClrLst meth="repeat">
+      <a:schemeClr val="dk1"/>
+    </dgm:linClrLst>
+    <dgm:effectClrLst/>
+    <dgm:txLinClrLst/>
+    <dgm:txFillClrLst/>
+    <dgm:txEffectClrLst/>
+  </dgm:styleLbl>
+  <dgm:styleLbl name="parChTrans2D3">
+    <dgm:fillClrLst meth="repeat">
+      <a:schemeClr val="dk1"/>
+    </dgm:fillClrLst>
+    <dgm:linClrLst meth="repeat">
+      <a:schemeClr val="dk1"/>
+    </dgm:linClrLst>
+    <dgm:effectClrLst/>
+    <dgm:txLinClrLst/>
+    <dgm:txFillClrLst/>
+    <dgm:txEffectClrLst/>
+  </dgm:styleLbl>
   <dgm:styleLbl name="parChTrans2D4">
     <dgm:fillClrLst meth="repeat">
-      <a:schemeClr val="accent1"/>
+      <a:schemeClr val="dk1"/>
     </dgm:fillClrLst>
     <dgm:linClrLst meth="repeat">
-      <a:schemeClr val="accent1"/>
+      <a:schemeClr val="dk1"/>
     </dgm:linClrLst>
     <dgm:effectClrLst/>
     <dgm:txLinClrLst/>
@@ -460,10 +514,10 @@
   </dgm:styleLbl>
   <dgm:styleLbl name="parChTrans1D1">
     <dgm:fillClrLst meth="repeat">
-      <a:schemeClr val="accent1"/>
+      <a:schemeClr val="dk1"/>
     </dgm:fillClrLst>
     <dgm:linClrLst meth="repeat">
-      <a:schemeClr val="accent1">
+      <a:schemeClr val="dk1">
         <a:shade val="60000"/>
       </a:schemeClr>
     </dgm:linClrLst>
@@ -476,10 +530,10 @@
   </dgm:styleLbl>
   <dgm:styleLbl name="parChTrans1D2">
     <dgm:fillClrLst meth="repeat">
-      <a:schemeClr val="accent1"/>
+      <a:schemeClr val="dk1"/>
     </dgm:fillClrLst>
     <dgm:linClrLst meth="repeat">
-      <a:schemeClr val="accent1">
+      <a:schemeClr val="dk1">
         <a:shade val="60000"/>
       </a:schemeClr>
     </dgm:linClrLst>
@@ -492,10 +546,10 @@
   </dgm:styleLbl>
   <dgm:styleLbl name="parChTrans1D3">
     <dgm:fillClrLst meth="repeat">
-      <a:schemeClr val="accent1"/>
+      <a:schemeClr val="dk1"/>
     </dgm:fillClrLst>
     <dgm:linClrLst meth="repeat">
-      <a:schemeClr val="accent1">
+      <a:schemeClr val="dk1">
         <a:shade val="80000"/>
       </a:schemeClr>
     </dgm:linClrLst>
@@ -508,10 +562,10 @@
   </dgm:styleLbl>
   <dgm:styleLbl name="parChTrans1D4">
     <dgm:fillClrLst meth="repeat">
-      <a:schemeClr val="accent1"/>
+      <a:schemeClr val="dk1"/>
     </dgm:fillClrLst>
     <dgm:linClrLst meth="repeat">
-      <a:schemeClr val="accent1">
+      <a:schemeClr val="dk1">
         <a:shade val="80000"/>
       </a:schemeClr>
     </dgm:linClrLst>
@@ -524,12 +578,13 @@
   </dgm:styleLbl>
   <dgm:styleLbl name="fgAcc1">
     <dgm:fillClrLst meth="repeat">
-      <a:schemeClr val="lt1">
+      <a:schemeClr val="dk1">
         <a:alpha val="90000"/>
+        <a:tint val="40000"/>
       </a:schemeClr>
     </dgm:fillClrLst>
     <dgm:linClrLst meth="repeat">
-      <a:schemeClr val="accent1"/>
+      <a:schemeClr val="dk1"/>
     </dgm:linClrLst>
     <dgm:effectClrLst/>
     <dgm:txLinClrLst/>
@@ -540,12 +595,13 @@
   </dgm:styleLbl>
   <dgm:styleLbl name="conFgAcc1">
     <dgm:fillClrLst meth="repeat">
-      <a:schemeClr val="lt1">
+      <a:schemeClr val="dk1">
         <a:alpha val="90000"/>
+        <a:tint val="40000"/>
       </a:schemeClr>
     </dgm:fillClrLst>
     <dgm:linClrLst meth="repeat">
-      <a:schemeClr val="accent1"/>
+      <a:schemeClr val="dk1"/>
     </dgm:linClrLst>
     <dgm:effectClrLst/>
     <dgm:txLinClrLst/>
@@ -556,12 +612,13 @@
   </dgm:styleLbl>
   <dgm:styleLbl name="alignAcc1">
     <dgm:fillClrLst meth="repeat">
-      <a:schemeClr val="lt1">
+      <a:schemeClr val="dk1">
         <a:alpha val="90000"/>
+        <a:tint val="40000"/>
       </a:schemeClr>
     </dgm:fillClrLst>
     <dgm:linClrLst meth="repeat">
-      <a:schemeClr val="accent1"/>
+      <a:schemeClr val="dk1"/>
     </dgm:linClrLst>
     <dgm:effectClrLst/>
     <dgm:txLinClrLst/>
@@ -572,12 +629,13 @@
   </dgm:styleLbl>
   <dgm:styleLbl name="trAlignAcc1">
     <dgm:fillClrLst meth="repeat">
-      <a:schemeClr val="lt1">
+      <a:schemeClr val="dk1">
         <a:alpha val="40000"/>
+        <a:tint val="40000"/>
       </a:schemeClr>
     </dgm:fillClrLst>
     <dgm:linClrLst meth="repeat">
-      <a:schemeClr val="accent1"/>
+      <a:schemeClr val="dk1"/>
     </dgm:linClrLst>
     <dgm:effectClrLst/>
     <dgm:txLinClrLst/>
@@ -588,12 +646,13 @@
   </dgm:styleLbl>
   <dgm:styleLbl name="bgAcc1">
     <dgm:fillClrLst meth="repeat">
-      <a:schemeClr val="lt1">
+      <a:schemeClr val="dk1">
         <a:alpha val="90000"/>
+        <a:tint val="40000"/>
       </a:schemeClr>
     </dgm:fillClrLst>
     <dgm:linClrLst meth="repeat">
-      <a:schemeClr val="accent1"/>
+      <a:schemeClr val="dk1"/>
     </dgm:linClrLst>
     <dgm:effectClrLst/>
     <dgm:txLinClrLst/>
@@ -607,7 +666,7 @@
       <a:schemeClr val="lt1"/>
     </dgm:fillClrLst>
     <dgm:linClrLst meth="repeat">
-      <a:schemeClr val="accent1"/>
+      <a:schemeClr val="dk1"/>
     </dgm:linClrLst>
     <dgm:effectClrLst/>
     <dgm:txLinClrLst/>
@@ -621,7 +680,7 @@
       <a:schemeClr val="lt1"/>
     </dgm:fillClrLst>
     <dgm:linClrLst meth="repeat">
-      <a:schemeClr val="accent1"/>
+      <a:schemeClr val="dk1"/>
     </dgm:linClrLst>
     <dgm:effectClrLst/>
     <dgm:txLinClrLst/>
@@ -635,7 +694,7 @@
       <a:schemeClr val="lt1"/>
     </dgm:fillClrLst>
     <dgm:linClrLst meth="repeat">
-      <a:schemeClr val="accent1"/>
+      <a:schemeClr val="dk1"/>
     </dgm:linClrLst>
     <dgm:effectClrLst/>
     <dgm:txLinClrLst/>
@@ -646,15 +705,14 @@
   </dgm:styleLbl>
   <dgm:styleLbl name="fgAccFollowNode1">
     <dgm:fillClrLst meth="repeat">
-      <a:schemeClr val="accent1">
+      <a:schemeClr val="lt1">
         <a:alpha val="90000"/>
         <a:tint val="40000"/>
       </a:schemeClr>
     </dgm:fillClrLst>
     <dgm:linClrLst meth="repeat">
-      <a:schemeClr val="accent1">
+      <a:schemeClr val="dk1">
         <a:alpha val="90000"/>
-        <a:tint val="40000"/>
       </a:schemeClr>
     </dgm:linClrLst>
     <dgm:effectClrLst/>
@@ -666,15 +724,14 @@
   </dgm:styleLbl>
   <dgm:styleLbl name="alignAccFollowNode1">
     <dgm:fillClrLst meth="repeat">
-      <a:schemeClr val="accent1">
+      <a:schemeClr val="lt1">
         <a:alpha val="90000"/>
         <a:tint val="40000"/>
       </a:schemeClr>
     </dgm:fillClrLst>
     <dgm:linClrLst meth="repeat">
-      <a:schemeClr val="accent1">
+      <a:schemeClr val="dk1">
         <a:alpha val="90000"/>
-        <a:tint val="40000"/>
       </a:schemeClr>
     </dgm:linClrLst>
     <dgm:effectClrLst/>
@@ -686,15 +743,14 @@
   </dgm:styleLbl>
   <dgm:styleLbl name="bgAccFollowNode1">
     <dgm:fillClrLst meth="repeat">
-      <a:schemeClr val="accent1">
+      <a:schemeClr val="lt1">
         <a:alpha val="90000"/>
         <a:tint val="40000"/>
       </a:schemeClr>
     </dgm:fillClrLst>
     <dgm:linClrLst meth="repeat">
-      <a:schemeClr val="accent1">
+      <a:schemeClr val="dk1">
         <a:alpha val="90000"/>
-        <a:tint val="40000"/>
       </a:schemeClr>
     </dgm:linClrLst>
     <dgm:effectClrLst/>
@@ -706,12 +762,13 @@
   </dgm:styleLbl>
   <dgm:styleLbl name="fgAcc0">
     <dgm:fillClrLst meth="repeat">
-      <a:schemeClr val="lt1">
+      <a:schemeClr val="dk1">
         <a:alpha val="90000"/>
+        <a:tint val="40000"/>
       </a:schemeClr>
     </dgm:fillClrLst>
     <dgm:linClrLst meth="repeat">
-      <a:schemeClr val="accent1"/>
+      <a:schemeClr val="dk1"/>
     </dgm:linClrLst>
     <dgm:effectClrLst/>
     <dgm:txLinClrLst/>
@@ -722,12 +779,13 @@
   </dgm:styleLbl>
   <dgm:styleLbl name="fgAcc2">
     <dgm:fillClrLst meth="repeat">
-      <a:schemeClr val="lt1">
+      <a:schemeClr val="dk1">
         <a:alpha val="90000"/>
+        <a:tint val="40000"/>
       </a:schemeClr>
     </dgm:fillClrLst>
     <dgm:linClrLst meth="repeat">
-      <a:schemeClr val="accent1"/>
+      <a:schemeClr val="dk1"/>
     </dgm:linClrLst>
     <dgm:effectClrLst/>
     <dgm:txLinClrLst/>
@@ -738,12 +796,13 @@
   </dgm:styleLbl>
   <dgm:styleLbl name="fgAcc3">
     <dgm:fillClrLst meth="repeat">
-      <a:schemeClr val="lt1">
+      <a:schemeClr val="dk1">
         <a:alpha val="90000"/>
+        <a:tint val="40000"/>
       </a:schemeClr>
     </dgm:fillClrLst>
     <dgm:linClrLst meth="repeat">
-      <a:schemeClr val="accent1"/>
+      <a:schemeClr val="dk1"/>
     </dgm:linClrLst>
     <dgm:effectClrLst/>
     <dgm:txLinClrLst/>
@@ -754,12 +813,13 @@
   </dgm:styleLbl>
   <dgm:styleLbl name="fgAcc4">
     <dgm:fillClrLst meth="repeat">
-      <a:schemeClr val="lt1">
+      <a:schemeClr val="dk1">
         <a:alpha val="90000"/>
+        <a:tint val="40000"/>
       </a:schemeClr>
     </dgm:fillClrLst>
     <dgm:linClrLst meth="repeat">
-      <a:schemeClr val="accent1"/>
+      <a:schemeClr val="dk1"/>
     </dgm:linClrLst>
     <dgm:effectClrLst/>
     <dgm:txLinClrLst/>
@@ -770,12 +830,12 @@
   </dgm:styleLbl>
   <dgm:styleLbl name="bgShp">
     <dgm:fillClrLst meth="repeat">
-      <a:schemeClr val="accent1">
+      <a:schemeClr val="dk1">
         <a:tint val="40000"/>
       </a:schemeClr>
     </dgm:fillClrLst>
     <dgm:linClrLst meth="repeat">
-      <a:schemeClr val="accent1"/>
+      <a:schemeClr val="dk1"/>
     </dgm:linClrLst>
     <dgm:effectClrLst/>
     <dgm:txLinClrLst/>
@@ -786,12 +846,12 @@
   </dgm:styleLbl>
   <dgm:styleLbl name="dkBgShp">
     <dgm:fillClrLst meth="repeat">
-      <a:schemeClr val="accent1">
+      <a:schemeClr val="dk1">
         <a:shade val="80000"/>
       </a:schemeClr>
     </dgm:fillClrLst>
     <dgm:linClrLst meth="repeat">
-      <a:schemeClr val="accent1"/>
+      <a:schemeClr val="dk1"/>
     </dgm:linClrLst>
     <dgm:effectClrLst/>
     <dgm:txLinClrLst/>
@@ -802,13 +862,13 @@
   </dgm:styleLbl>
   <dgm:styleLbl name="trBgShp">
     <dgm:fillClrLst meth="repeat">
-      <a:schemeClr val="accent1">
+      <a:schemeClr val="dk1">
         <a:tint val="50000"/>
         <a:alpha val="40000"/>
       </a:schemeClr>
     </dgm:fillClrLst>
     <dgm:linClrLst meth="repeat">
-      <a:schemeClr val="accent1"/>
+      <a:schemeClr val="dk1"/>
     </dgm:linClrLst>
     <dgm:effectClrLst/>
     <dgm:txLinClrLst/>
@@ -819,7 +879,7 @@
   </dgm:styleLbl>
   <dgm:styleLbl name="fgShp">
     <dgm:fillClrLst meth="repeat">
-      <a:schemeClr val="accent1">
+      <a:schemeClr val="dk1">
         <a:tint val="60000"/>
       </a:schemeClr>
     </dgm:fillClrLst>
@@ -858,7 +918,7 @@
 <dgm:dataModel xmlns:dgm="http://schemas.openxmlformats.org/drawingml/2006/diagram" xmlns:a="http://schemas.openxmlformats.org/drawingml/2006/main">
   <dgm:ptLst>
     <dgm:pt modelId="{8234A810-A117-FF47-AF16-7B3AD6BABEE7}" type="doc">
-      <dgm:prSet loTypeId="urn:microsoft.com/office/officeart/2005/8/layout/cycle3" loCatId="" qsTypeId="urn:microsoft.com/office/officeart/2005/8/quickstyle/simple3" qsCatId="simple" csTypeId="urn:microsoft.com/office/officeart/2005/8/colors/accent1_2" csCatId="accent1" phldr="1"/>
+      <dgm:prSet loTypeId="urn:microsoft.com/office/officeart/2005/8/layout/cycle3" loCatId="" qsTypeId="urn:microsoft.com/office/officeart/2005/8/quickstyle/simple1" qsCatId="simple" csTypeId="urn:microsoft.com/office/officeart/2005/8/colors/accent0_1" csCatId="mainScheme" phldr="1"/>
       <dgm:spPr/>
       <dgm:t>
         <a:bodyPr/>
@@ -876,10 +936,16 @@
         <a:lstStyle/>
         <a:p>
           <a:r>
-            <a:rPr lang="de-DE" dirty="0" smtClean="0"/>
+            <a:rPr lang="de-DE" dirty="0" smtClean="0">
+              <a:latin typeface="Univers CE 45 Light"/>
+              <a:cs typeface="Univers CE 45 Light"/>
+            </a:rPr>
             <a:t>(1) Diagramm nimmt ein berechnetes Layout an</a:t>
           </a:r>
-          <a:endParaRPr lang="de-DE" dirty="0"/>
+          <a:endParaRPr lang="de-DE" dirty="0">
+            <a:latin typeface="Univers CE 45 Light"/>
+            <a:cs typeface="Univers CE 45 Light"/>
+          </a:endParaRPr>
         </a:p>
       </dgm:t>
     </dgm:pt>
@@ -890,7 +956,10 @@
         <a:bodyPr/>
         <a:lstStyle/>
         <a:p>
-          <a:endParaRPr lang="de-DE"/>
+          <a:endParaRPr lang="de-DE">
+            <a:latin typeface="Univers CE 45 Light"/>
+            <a:cs typeface="Univers CE 45 Light"/>
+          </a:endParaRPr>
         </a:p>
       </dgm:t>
     </dgm:pt>
@@ -901,7 +970,10 @@
         <a:bodyPr/>
         <a:lstStyle/>
         <a:p>
-          <a:endParaRPr lang="de-DE"/>
+          <a:endParaRPr lang="de-DE">
+            <a:latin typeface="Univers CE 45 Light"/>
+            <a:cs typeface="Univers CE 45 Light"/>
+          </a:endParaRPr>
         </a:p>
       </dgm:t>
     </dgm:pt>
@@ -913,10 +985,16 @@
         <a:lstStyle/>
         <a:p>
           <a:r>
-            <a:rPr lang="de-DE" dirty="0" smtClean="0"/>
+            <a:rPr lang="de-DE" dirty="0" smtClean="0">
+              <a:latin typeface="Univers CE 45 Light"/>
+              <a:cs typeface="Univers CE 45 Light"/>
+            </a:rPr>
             <a:t>(2) Ausführung einer Bearbeitungsaktion durch den Nutzer</a:t>
           </a:r>
-          <a:endParaRPr lang="de-DE" dirty="0"/>
+          <a:endParaRPr lang="de-DE" dirty="0">
+            <a:latin typeface="Univers CE 45 Light"/>
+            <a:cs typeface="Univers CE 45 Light"/>
+          </a:endParaRPr>
         </a:p>
       </dgm:t>
     </dgm:pt>
@@ -927,7 +1005,10 @@
         <a:bodyPr/>
         <a:lstStyle/>
         <a:p>
-          <a:endParaRPr lang="de-DE"/>
+          <a:endParaRPr lang="de-DE">
+            <a:latin typeface="Univers CE 45 Light"/>
+            <a:cs typeface="Univers CE 45 Light"/>
+          </a:endParaRPr>
         </a:p>
       </dgm:t>
     </dgm:pt>
@@ -938,7 +1019,10 @@
         <a:bodyPr/>
         <a:lstStyle/>
         <a:p>
-          <a:endParaRPr lang="de-DE"/>
+          <a:endParaRPr lang="de-DE">
+            <a:latin typeface="Univers CE 45 Light"/>
+            <a:cs typeface="Univers CE 45 Light"/>
+          </a:endParaRPr>
         </a:p>
       </dgm:t>
     </dgm:pt>
@@ -950,7 +1034,10 @@
         <a:lstStyle/>
         <a:p>
           <a:r>
-            <a:rPr lang="de-DE" dirty="0" smtClean="0"/>
+            <a:rPr lang="de-DE" dirty="0" smtClean="0">
+              <a:latin typeface="Univers CE 45 Light"/>
+              <a:cs typeface="Univers CE 45 Light"/>
+            </a:rPr>
             <a:t>(3) Erzeugung eines Layout-Ereignisses</a:t>
           </a:r>
         </a:p>
@@ -963,7 +1050,10 @@
         <a:bodyPr/>
         <a:lstStyle/>
         <a:p>
-          <a:endParaRPr lang="de-DE"/>
+          <a:endParaRPr lang="de-DE">
+            <a:latin typeface="Univers CE 45 Light"/>
+            <a:cs typeface="Univers CE 45 Light"/>
+          </a:endParaRPr>
         </a:p>
       </dgm:t>
     </dgm:pt>
@@ -974,7 +1064,10 @@
         <a:bodyPr/>
         <a:lstStyle/>
         <a:p>
-          <a:endParaRPr lang="de-DE"/>
+          <a:endParaRPr lang="de-DE">
+            <a:latin typeface="Univers CE 45 Light"/>
+            <a:cs typeface="Univers CE 45 Light"/>
+          </a:endParaRPr>
         </a:p>
       </dgm:t>
     </dgm:pt>
@@ -986,10 +1079,16 @@
         <a:lstStyle/>
         <a:p>
           <a:r>
-            <a:rPr lang="de-DE" dirty="0" smtClean="0"/>
+            <a:rPr lang="de-DE" dirty="0" smtClean="0">
+              <a:latin typeface="Univers CE 45 Light"/>
+              <a:cs typeface="Univers CE 45 Light"/>
+            </a:rPr>
             <a:t>(4) Verarbeitung des Layout-Ereignisses durch die Layout-Engine</a:t>
           </a:r>
-          <a:endParaRPr lang="de-DE" dirty="0"/>
+          <a:endParaRPr lang="de-DE" dirty="0">
+            <a:latin typeface="Univers CE 45 Light"/>
+            <a:cs typeface="Univers CE 45 Light"/>
+          </a:endParaRPr>
         </a:p>
       </dgm:t>
     </dgm:pt>
@@ -1000,7 +1099,10 @@
         <a:bodyPr/>
         <a:lstStyle/>
         <a:p>
-          <a:endParaRPr lang="de-DE"/>
+          <a:endParaRPr lang="de-DE">
+            <a:latin typeface="Univers CE 45 Light"/>
+            <a:cs typeface="Univers CE 45 Light"/>
+          </a:endParaRPr>
         </a:p>
       </dgm:t>
     </dgm:pt>
@@ -1011,7 +1113,10 @@
         <a:bodyPr/>
         <a:lstStyle/>
         <a:p>
-          <a:endParaRPr lang="de-DE"/>
+          <a:endParaRPr lang="de-DE">
+            <a:latin typeface="Univers CE 45 Light"/>
+            <a:cs typeface="Univers CE 45 Light"/>
+          </a:endParaRPr>
         </a:p>
       </dgm:t>
     </dgm:pt>
@@ -1023,10 +1128,16 @@
         <a:lstStyle/>
         <a:p>
           <a:r>
-            <a:rPr lang="de-DE" dirty="0" smtClean="0"/>
+            <a:rPr lang="de-DE" dirty="0" smtClean="0">
+              <a:latin typeface="Univers CE 45 Light"/>
+              <a:cs typeface="Univers CE 45 Light"/>
+            </a:rPr>
             <a:t>(5) Berechnung eines neuen Layouts</a:t>
           </a:r>
-          <a:endParaRPr lang="de-DE" dirty="0"/>
+          <a:endParaRPr lang="de-DE" dirty="0">
+            <a:latin typeface="Univers CE 45 Light"/>
+            <a:cs typeface="Univers CE 45 Light"/>
+          </a:endParaRPr>
         </a:p>
       </dgm:t>
     </dgm:pt>
@@ -1037,7 +1148,10 @@
         <a:bodyPr/>
         <a:lstStyle/>
         <a:p>
-          <a:endParaRPr lang="de-DE"/>
+          <a:endParaRPr lang="de-DE">
+            <a:latin typeface="Univers CE 45 Light"/>
+            <a:cs typeface="Univers CE 45 Light"/>
+          </a:endParaRPr>
         </a:p>
       </dgm:t>
     </dgm:pt>
@@ -1048,7 +1162,10 @@
         <a:bodyPr/>
         <a:lstStyle/>
         <a:p>
-          <a:endParaRPr lang="de-DE"/>
+          <a:endParaRPr lang="de-DE">
+            <a:latin typeface="Univers CE 45 Light"/>
+            <a:cs typeface="Univers CE 45 Light"/>
+          </a:endParaRPr>
         </a:p>
       </dgm:t>
     </dgm:pt>
@@ -1060,10 +1177,16 @@
         <a:lstStyle/>
         <a:p>
           <a:r>
-            <a:rPr lang="de-DE" dirty="0" smtClean="0"/>
+            <a:rPr lang="de-DE" dirty="0" smtClean="0">
+              <a:latin typeface="Univers CE 45 Light"/>
+              <a:cs typeface="Univers CE 45 Light"/>
+            </a:rPr>
             <a:t>(6) Anwendung des neuen Layouts auf das Diagramm mit Hilfe eines Layout-Übergangs</a:t>
           </a:r>
-          <a:endParaRPr lang="de-DE" dirty="0"/>
+          <a:endParaRPr lang="de-DE" dirty="0">
+            <a:latin typeface="Univers CE 45 Light"/>
+            <a:cs typeface="Univers CE 45 Light"/>
+          </a:endParaRPr>
         </a:p>
       </dgm:t>
     </dgm:pt>
@@ -1074,7 +1197,10 @@
         <a:bodyPr/>
         <a:lstStyle/>
         <a:p>
-          <a:endParaRPr lang="de-DE"/>
+          <a:endParaRPr lang="de-DE">
+            <a:latin typeface="Univers CE 45 Light"/>
+            <a:cs typeface="Univers CE 45 Light"/>
+          </a:endParaRPr>
         </a:p>
       </dgm:t>
     </dgm:pt>
@@ -1085,7 +1211,10 @@
         <a:bodyPr/>
         <a:lstStyle/>
         <a:p>
-          <a:endParaRPr lang="de-DE"/>
+          <a:endParaRPr lang="de-DE">
+            <a:latin typeface="Univers CE 45 Light"/>
+            <a:cs typeface="Univers CE 45 Light"/>
+          </a:endParaRPr>
         </a:p>
       </dgm:t>
     </dgm:pt>
@@ -1097,10 +1226,24 @@
         </dgm:presLayoutVars>
       </dgm:prSet>
       <dgm:spPr/>
+      <dgm:t>
+        <a:bodyPr/>
+        <a:lstStyle/>
+        <a:p>
+          <a:endParaRPr lang="de-DE"/>
+        </a:p>
+      </dgm:t>
     </dgm:pt>
     <dgm:pt modelId="{E2176B8F-C860-B547-BD74-AB706135B0BF}" type="pres">
       <dgm:prSet presAssocID="{8234A810-A117-FF47-AF16-7B3AD6BABEE7}" presName="cycle" presStyleCnt="0"/>
       <dgm:spPr/>
+      <dgm:t>
+        <a:bodyPr/>
+        <a:lstStyle/>
+        <a:p>
+          <a:endParaRPr lang="de-DE"/>
+        </a:p>
+      </dgm:t>
     </dgm:pt>
     <dgm:pt modelId="{A857E1A7-868C-D54D-B494-915583058FFF}" type="pres">
       <dgm:prSet presAssocID="{2C06A92D-B793-B045-8B8B-5DB603D35589}" presName="nodeFirstNode" presStyleLbl="node1" presStyleIdx="0" presStyleCnt="6">
@@ -1109,13 +1252,27 @@
         </dgm:presLayoutVars>
       </dgm:prSet>
       <dgm:spPr/>
+      <dgm:t>
+        <a:bodyPr/>
+        <a:lstStyle/>
+        <a:p>
+          <a:endParaRPr lang="de-DE"/>
+        </a:p>
+      </dgm:t>
     </dgm:pt>
     <dgm:pt modelId="{3A8667F6-7081-0F40-A840-7F33D31ED28B}" type="pres">
       <dgm:prSet presAssocID="{10913C84-617F-214B-A257-FE5FD64FA724}" presName="sibTransFirstNode" presStyleLbl="bgShp" presStyleIdx="0" presStyleCnt="1"/>
       <dgm:spPr/>
+      <dgm:t>
+        <a:bodyPr/>
+        <a:lstStyle/>
+        <a:p>
+          <a:endParaRPr lang="de-DE"/>
+        </a:p>
+      </dgm:t>
     </dgm:pt>
     <dgm:pt modelId="{C7346C2A-C3FD-8E43-B9C5-1A78E9A802D7}" type="pres">
-      <dgm:prSet presAssocID="{9A940AF4-74D2-2848-B3E0-64137986A51C}" presName="nodeFollowingNodes" presStyleLbl="node1" presStyleIdx="1" presStyleCnt="6">
+      <dgm:prSet presAssocID="{9A940AF4-74D2-2848-B3E0-64137986A51C}" presName="nodeFollowingNodes" presStyleLbl="node1" presStyleIdx="1" presStyleCnt="6" custScaleX="101647" custScaleY="104421" custRadScaleRad="95754" custRadScaleInc="12519">
         <dgm:presLayoutVars>
           <dgm:bulletEnabled val="1"/>
         </dgm:presLayoutVars>
@@ -1130,7 +1287,7 @@
       </dgm:t>
     </dgm:pt>
     <dgm:pt modelId="{FFE56FDF-7B20-5E4E-A446-13E3500AA863}" type="pres">
-      <dgm:prSet presAssocID="{A9AC46AE-F99B-6C43-A4E5-7C09E25F11DB}" presName="nodeFollowingNodes" presStyleLbl="node1" presStyleIdx="2" presStyleCnt="6">
+      <dgm:prSet presAssocID="{A9AC46AE-F99B-6C43-A4E5-7C09E25F11DB}" presName="nodeFollowingNodes" presStyleLbl="node1" presStyleIdx="2" presStyleCnt="6" custRadScaleRad="95234" custRadScaleInc="-12206">
         <dgm:presLayoutVars>
           <dgm:bulletEnabled val="1"/>
         </dgm:presLayoutVars>
@@ -1160,7 +1317,7 @@
       </dgm:t>
     </dgm:pt>
     <dgm:pt modelId="{59DC55AD-0EAB-BC43-A0B9-0E9C3A0B5158}" type="pres">
-      <dgm:prSet presAssocID="{E3A26893-6C65-3048-BEF2-03D5E747ED00}" presName="nodeFollowingNodes" presStyleLbl="node1" presStyleIdx="4" presStyleCnt="6">
+      <dgm:prSet presAssocID="{E3A26893-6C65-3048-BEF2-03D5E747ED00}" presName="nodeFollowingNodes" presStyleLbl="node1" presStyleIdx="4" presStyleCnt="6" custRadScaleRad="94165" custRadScaleInc="11649">
         <dgm:presLayoutVars>
           <dgm:bulletEnabled val="1"/>
         </dgm:presLayoutVars>
@@ -1175,7 +1332,7 @@
       </dgm:t>
     </dgm:pt>
     <dgm:pt modelId="{D4D72BC1-EC95-9B41-BE0D-917E7A0F21C7}" type="pres">
-      <dgm:prSet presAssocID="{31A7396F-D89A-764B-911A-D55DEE758B6E}" presName="nodeFollowingNodes" presStyleLbl="node1" presStyleIdx="5" presStyleCnt="6">
+      <dgm:prSet presAssocID="{31A7396F-D89A-764B-911A-D55DEE758B6E}" presName="nodeFollowingNodes" presStyleLbl="node1" presStyleIdx="5" presStyleCnt="6" custRadScaleRad="95470" custRadScaleInc="-11581">
         <dgm:presLayoutVars>
           <dgm:bulletEnabled val="1"/>
         </dgm:presLayoutVars>
@@ -1191,20 +1348,20 @@
     </dgm:pt>
   </dgm:ptLst>
   <dgm:cxnLst>
+    <dgm:cxn modelId="{242E1F25-250D-D04A-9BFA-EFF6B83EF1BC}" srcId="{8234A810-A117-FF47-AF16-7B3AD6BABEE7}" destId="{2C06A92D-B793-B045-8B8B-5DB603D35589}" srcOrd="0" destOrd="0" parTransId="{F2E1B9BA-067F-2E45-9826-4FA3C821897A}" sibTransId="{10913C84-617F-214B-A257-FE5FD64FA724}"/>
+    <dgm:cxn modelId="{437BD528-6DFD-D843-B074-68267AB1276B}" type="presOf" srcId="{8234A810-A117-FF47-AF16-7B3AD6BABEE7}" destId="{2A0650BB-A370-6749-A4CF-494E6D63733B}" srcOrd="0" destOrd="0" presId="urn:microsoft.com/office/officeart/2005/8/layout/cycle3"/>
+    <dgm:cxn modelId="{90CC2178-EC84-A24A-9C0C-54AE3F36CE11}" type="presOf" srcId="{A9AC46AE-F99B-6C43-A4E5-7C09E25F11DB}" destId="{FFE56FDF-7B20-5E4E-A446-13E3500AA863}" srcOrd="0" destOrd="0" presId="urn:microsoft.com/office/officeart/2005/8/layout/cycle3"/>
+    <dgm:cxn modelId="{7BA74730-DDD9-3640-AF03-FBC0A688FD61}" srcId="{8234A810-A117-FF47-AF16-7B3AD6BABEE7}" destId="{9A940AF4-74D2-2848-B3E0-64137986A51C}" srcOrd="1" destOrd="0" parTransId="{7494AF7D-2C68-8B4D-9E77-3B534ADCA907}" sibTransId="{479F9EEB-DE65-9546-A743-D42681B720AD}"/>
+    <dgm:cxn modelId="{DF090BF3-E3B9-E04B-A9B1-52C2CC991980}" type="presOf" srcId="{9A940AF4-74D2-2848-B3E0-64137986A51C}" destId="{C7346C2A-C3FD-8E43-B9C5-1A78E9A802D7}" srcOrd="0" destOrd="0" presId="urn:microsoft.com/office/officeart/2005/8/layout/cycle3"/>
+    <dgm:cxn modelId="{8440A9D7-F20C-394C-980C-AABD71E91F00}" type="presOf" srcId="{31A7396F-D89A-764B-911A-D55DEE758B6E}" destId="{D4D72BC1-EC95-9B41-BE0D-917E7A0F21C7}" srcOrd="0" destOrd="0" presId="urn:microsoft.com/office/officeart/2005/8/layout/cycle3"/>
+    <dgm:cxn modelId="{F3C5B11C-D882-C942-820F-0529C29C78F7}" srcId="{8234A810-A117-FF47-AF16-7B3AD6BABEE7}" destId="{A9AC46AE-F99B-6C43-A4E5-7C09E25F11DB}" srcOrd="2" destOrd="0" parTransId="{21889718-F45A-C54A-958D-651211DE913B}" sibTransId="{6A88CF1E-4C04-964B-A466-FB4CCF18C8BC}"/>
+    <dgm:cxn modelId="{82C8DF40-C318-1F42-BC75-D8499C3094A4}" type="presOf" srcId="{2C06A92D-B793-B045-8B8B-5DB603D35589}" destId="{A857E1A7-868C-D54D-B494-915583058FFF}" srcOrd="0" destOrd="0" presId="urn:microsoft.com/office/officeart/2005/8/layout/cycle3"/>
+    <dgm:cxn modelId="{7EAA37FE-2266-BA4B-91E5-BA94C61BAB3E}" type="presOf" srcId="{9788C395-F0AC-1843-8B39-D7C35A9DFDAC}" destId="{562E43C6-D710-544D-A0BA-ECCA9DE1FAE8}" srcOrd="0" destOrd="0" presId="urn:microsoft.com/office/officeart/2005/8/layout/cycle3"/>
+    <dgm:cxn modelId="{D16F9207-A0B3-1644-8F7B-65C250F9415D}" srcId="{8234A810-A117-FF47-AF16-7B3AD6BABEE7}" destId="{31A7396F-D89A-764B-911A-D55DEE758B6E}" srcOrd="5" destOrd="0" parTransId="{56F02CEE-2164-ED47-ACA1-8F545AA8D915}" sibTransId="{AFAA4209-4911-E74B-B6AF-B40736276C88}"/>
+    <dgm:cxn modelId="{C239250F-C049-3F47-8BE8-52053B381B7E}" srcId="{8234A810-A117-FF47-AF16-7B3AD6BABEE7}" destId="{E3A26893-6C65-3048-BEF2-03D5E747ED00}" srcOrd="4" destOrd="0" parTransId="{62FA99A6-0563-AD42-AF00-0F3A64A8E932}" sibTransId="{B38BA055-4CBE-6749-AF56-A1B2B988F3AA}"/>
     <dgm:cxn modelId="{92A7F19E-AF07-E64A-8278-B45B1C7D77D2}" type="presOf" srcId="{E3A26893-6C65-3048-BEF2-03D5E747ED00}" destId="{59DC55AD-0EAB-BC43-A0B9-0E9C3A0B5158}" srcOrd="0" destOrd="0" presId="urn:microsoft.com/office/officeart/2005/8/layout/cycle3"/>
-    <dgm:cxn modelId="{7BA74730-DDD9-3640-AF03-FBC0A688FD61}" srcId="{8234A810-A117-FF47-AF16-7B3AD6BABEE7}" destId="{9A940AF4-74D2-2848-B3E0-64137986A51C}" srcOrd="1" destOrd="0" parTransId="{7494AF7D-2C68-8B4D-9E77-3B534ADCA907}" sibTransId="{479F9EEB-DE65-9546-A743-D42681B720AD}"/>
-    <dgm:cxn modelId="{D16F9207-A0B3-1644-8F7B-65C250F9415D}" srcId="{8234A810-A117-FF47-AF16-7B3AD6BABEE7}" destId="{31A7396F-D89A-764B-911A-D55DEE758B6E}" srcOrd="5" destOrd="0" parTransId="{56F02CEE-2164-ED47-ACA1-8F545AA8D915}" sibTransId="{AFAA4209-4911-E74B-B6AF-B40736276C88}"/>
-    <dgm:cxn modelId="{437BD528-6DFD-D843-B074-68267AB1276B}" type="presOf" srcId="{8234A810-A117-FF47-AF16-7B3AD6BABEE7}" destId="{2A0650BB-A370-6749-A4CF-494E6D63733B}" srcOrd="0" destOrd="0" presId="urn:microsoft.com/office/officeart/2005/8/layout/cycle3"/>
-    <dgm:cxn modelId="{DF090BF3-E3B9-E04B-A9B1-52C2CC991980}" type="presOf" srcId="{9A940AF4-74D2-2848-B3E0-64137986A51C}" destId="{C7346C2A-C3FD-8E43-B9C5-1A78E9A802D7}" srcOrd="0" destOrd="0" presId="urn:microsoft.com/office/officeart/2005/8/layout/cycle3"/>
+    <dgm:cxn modelId="{76D7B8E9-7FF3-8649-B75B-557D84E7A40F}" type="presOf" srcId="{10913C84-617F-214B-A257-FE5FD64FA724}" destId="{3A8667F6-7081-0F40-A840-7F33D31ED28B}" srcOrd="0" destOrd="0" presId="urn:microsoft.com/office/officeart/2005/8/layout/cycle3"/>
     <dgm:cxn modelId="{06AEA56C-42E6-4D4F-93F0-6300B8D324C2}" srcId="{8234A810-A117-FF47-AF16-7B3AD6BABEE7}" destId="{9788C395-F0AC-1843-8B39-D7C35A9DFDAC}" srcOrd="3" destOrd="0" parTransId="{67903A19-850F-064D-A270-BD0DC2CA7132}" sibTransId="{44B905ED-CEE6-974F-A451-2346ADB2465F}"/>
-    <dgm:cxn modelId="{90CC2178-EC84-A24A-9C0C-54AE3F36CE11}" type="presOf" srcId="{A9AC46AE-F99B-6C43-A4E5-7C09E25F11DB}" destId="{FFE56FDF-7B20-5E4E-A446-13E3500AA863}" srcOrd="0" destOrd="0" presId="urn:microsoft.com/office/officeart/2005/8/layout/cycle3"/>
-    <dgm:cxn modelId="{8440A9D7-F20C-394C-980C-AABD71E91F00}" type="presOf" srcId="{31A7396F-D89A-764B-911A-D55DEE758B6E}" destId="{D4D72BC1-EC95-9B41-BE0D-917E7A0F21C7}" srcOrd="0" destOrd="0" presId="urn:microsoft.com/office/officeart/2005/8/layout/cycle3"/>
-    <dgm:cxn modelId="{C239250F-C049-3F47-8BE8-52053B381B7E}" srcId="{8234A810-A117-FF47-AF16-7B3AD6BABEE7}" destId="{E3A26893-6C65-3048-BEF2-03D5E747ED00}" srcOrd="4" destOrd="0" parTransId="{62FA99A6-0563-AD42-AF00-0F3A64A8E932}" sibTransId="{B38BA055-4CBE-6749-AF56-A1B2B988F3AA}"/>
-    <dgm:cxn modelId="{F3C5B11C-D882-C942-820F-0529C29C78F7}" srcId="{8234A810-A117-FF47-AF16-7B3AD6BABEE7}" destId="{A9AC46AE-F99B-6C43-A4E5-7C09E25F11DB}" srcOrd="2" destOrd="0" parTransId="{21889718-F45A-C54A-958D-651211DE913B}" sibTransId="{6A88CF1E-4C04-964B-A466-FB4CCF18C8BC}"/>
-    <dgm:cxn modelId="{7EAA37FE-2266-BA4B-91E5-BA94C61BAB3E}" type="presOf" srcId="{9788C395-F0AC-1843-8B39-D7C35A9DFDAC}" destId="{562E43C6-D710-544D-A0BA-ECCA9DE1FAE8}" srcOrd="0" destOrd="0" presId="urn:microsoft.com/office/officeart/2005/8/layout/cycle3"/>
-    <dgm:cxn modelId="{82C8DF40-C318-1F42-BC75-D8499C3094A4}" type="presOf" srcId="{2C06A92D-B793-B045-8B8B-5DB603D35589}" destId="{A857E1A7-868C-D54D-B494-915583058FFF}" srcOrd="0" destOrd="0" presId="urn:microsoft.com/office/officeart/2005/8/layout/cycle3"/>
-    <dgm:cxn modelId="{76D7B8E9-7FF3-8649-B75B-557D84E7A40F}" type="presOf" srcId="{10913C84-617F-214B-A257-FE5FD64FA724}" destId="{3A8667F6-7081-0F40-A840-7F33D31ED28B}" srcOrd="0" destOrd="0" presId="urn:microsoft.com/office/officeart/2005/8/layout/cycle3"/>
-    <dgm:cxn modelId="{242E1F25-250D-D04A-9BFA-EFF6B83EF1BC}" srcId="{8234A810-A117-FF47-AF16-7B3AD6BABEE7}" destId="{2C06A92D-B793-B045-8B8B-5DB603D35589}" srcOrd="0" destOrd="0" parTransId="{F2E1B9BA-067F-2E45-9826-4FA3C821897A}" sibTransId="{10913C84-617F-214B-A257-FE5FD64FA724}"/>
     <dgm:cxn modelId="{1FEA3514-7959-F64D-87C8-E2A24DE8E56D}" type="presParOf" srcId="{2A0650BB-A370-6749-A4CF-494E6D63733B}" destId="{E2176B8F-C860-B547-BD74-AB706135B0BF}" srcOrd="0" destOrd="0" presId="urn:microsoft.com/office/officeart/2005/8/layout/cycle3"/>
     <dgm:cxn modelId="{147E7369-7DF5-544B-BDBB-1554049E86CD}" type="presParOf" srcId="{E2176B8F-C860-B547-BD74-AB706135B0BF}" destId="{A857E1A7-868C-D54D-B494-915583058FFF}" srcOrd="0" destOrd="0" presId="urn:microsoft.com/office/officeart/2005/8/layout/cycle3"/>
     <dgm:cxn modelId="{A4BD08D9-7712-174E-A4F0-54795430FA49}" type="presParOf" srcId="{E2176B8F-C860-B547-BD74-AB706135B0BF}" destId="{3A8667F6-7081-0F40-A840-7F33D31ED28B}" srcOrd="1" destOrd="0" presId="urn:microsoft.com/office/officeart/2005/8/layout/cycle3"/>
@@ -1239,20 +1396,20 @@
       </dsp:nvSpPr>
       <dsp:spPr>
         <a:xfrm>
-          <a:off x="1176129" y="-4042"/>
-          <a:ext cx="4494776" cy="4494776"/>
+          <a:off x="1024008" y="-5070"/>
+          <a:ext cx="4784206" cy="4784206"/>
         </a:xfrm>
         <a:prstGeom prst="circularArrow">
           <a:avLst>
             <a:gd name="adj1" fmla="val 5274"/>
             <a:gd name="adj2" fmla="val 312630"/>
-            <a:gd name="adj3" fmla="val 14249305"/>
-            <a:gd name="adj4" fmla="val 17114639"/>
+            <a:gd name="adj3" fmla="val 14247746"/>
+            <a:gd name="adj4" fmla="val 17115550"/>
             <a:gd name="adj5" fmla="val 5477"/>
           </a:avLst>
         </a:prstGeom>
         <a:solidFill>
-          <a:schemeClr val="accent1">
+          <a:schemeClr val="dk1">
             <a:tint val="40000"/>
             <a:hueOff val="0"/>
             <a:satOff val="0"/>
@@ -1263,13 +1420,7 @@
         <a:ln>
           <a:noFill/>
         </a:ln>
-        <a:effectLst>
-          <a:outerShdw blurRad="40000" dist="20000" dir="5400000" rotWithShape="0">
-            <a:srgbClr val="000000">
-              <a:alpha val="38000"/>
-            </a:srgbClr>
-          </a:outerShdw>
-        </a:effectLst>
+        <a:effectLst/>
       </dsp:spPr>
       <dsp:style>
         <a:lnRef idx="0">
@@ -1278,7 +1429,7 @@
         <a:fillRef idx="1">
           <a:scrgbClr r="0" g="0" b="0"/>
         </a:fillRef>
-        <a:effectRef idx="1">
+        <a:effectRef idx="0">
           <a:scrgbClr r="0" g="0" b="0"/>
         </a:effectRef>
         <a:fontRef idx="minor"/>
@@ -1291,86 +1442,55 @@
       </dsp:nvSpPr>
       <dsp:spPr>
         <a:xfrm>
-          <a:off x="2579339" y="1771"/>
-          <a:ext cx="1688355" cy="844177"/>
+          <a:off x="2516769" y="1089"/>
+          <a:ext cx="1798683" cy="899341"/>
         </a:xfrm>
         <a:prstGeom prst="roundRect">
           <a:avLst/>
         </a:prstGeom>
-        <a:gradFill rotWithShape="0">
-          <a:gsLst>
-            <a:gs pos="0">
-              <a:schemeClr val="accent1">
-                <a:hueOff val="0"/>
-                <a:satOff val="0"/>
-                <a:lumOff val="0"/>
-                <a:alphaOff val="0"/>
-                <a:tint val="50000"/>
-                <a:satMod val="300000"/>
-              </a:schemeClr>
-            </a:gs>
-            <a:gs pos="35000">
-              <a:schemeClr val="accent1">
-                <a:hueOff val="0"/>
-                <a:satOff val="0"/>
-                <a:lumOff val="0"/>
-                <a:alphaOff val="0"/>
-                <a:tint val="37000"/>
-                <a:satMod val="300000"/>
-              </a:schemeClr>
-            </a:gs>
-            <a:gs pos="100000">
-              <a:schemeClr val="accent1">
-                <a:hueOff val="0"/>
-                <a:satOff val="0"/>
-                <a:lumOff val="0"/>
-                <a:alphaOff val="0"/>
-                <a:tint val="15000"/>
-                <a:satMod val="350000"/>
-              </a:schemeClr>
-            </a:gs>
-          </a:gsLst>
-          <a:lin ang="16200000" scaled="1"/>
-        </a:gradFill>
-        <a:ln>
-          <a:noFill/>
+        <a:solidFill>
+          <a:schemeClr val="lt1">
+            <a:hueOff val="0"/>
+            <a:satOff val="0"/>
+            <a:lumOff val="0"/>
+            <a:alphaOff val="0"/>
+          </a:schemeClr>
+        </a:solidFill>
+        <a:ln w="25400" cap="flat" cmpd="sng" algn="ctr">
+          <a:solidFill>
+            <a:schemeClr val="dk1">
+              <a:shade val="80000"/>
+              <a:hueOff val="0"/>
+              <a:satOff val="0"/>
+              <a:lumOff val="0"/>
+              <a:alphaOff val="0"/>
+            </a:schemeClr>
+          </a:solidFill>
+          <a:prstDash val="solid"/>
         </a:ln>
-        <a:effectLst>
-          <a:outerShdw blurRad="40000" dist="20000" dir="5400000" rotWithShape="0">
-            <a:srgbClr val="000000">
-              <a:alpha val="38000"/>
-            </a:srgbClr>
-          </a:outerShdw>
-        </a:effectLst>
-        <a:scene3d>
-          <a:camera prst="orthographicFront"/>
-          <a:lightRig rig="flat" dir="t"/>
-        </a:scene3d>
-        <a:sp3d prstMaterial="dkEdge">
-          <a:bevelT w="8200" h="38100"/>
-        </a:sp3d>
+        <a:effectLst/>
       </dsp:spPr>
       <dsp:style>
-        <a:lnRef idx="0">
+        <a:lnRef idx="2">
           <a:scrgbClr r="0" g="0" b="0"/>
         </a:lnRef>
-        <a:fillRef idx="2">
+        <a:fillRef idx="1">
           <a:scrgbClr r="0" g="0" b="0"/>
         </a:fillRef>
-        <a:effectRef idx="1">
+        <a:effectRef idx="0">
           <a:scrgbClr r="0" g="0" b="0"/>
         </a:effectRef>
         <a:fontRef idx="minor">
-          <a:schemeClr val="dk1"/>
+          <a:schemeClr val="lt1"/>
         </a:fontRef>
       </dsp:style>
       <dsp:txBody>
-        <a:bodyPr spcFirstLastPara="0" vert="horz" wrap="square" lIns="45720" tIns="45720" rIns="45720" bIns="45720" numCol="1" spcCol="1270" anchor="ctr" anchorCtr="0">
+        <a:bodyPr spcFirstLastPara="0" vert="horz" wrap="square" lIns="41910" tIns="41910" rIns="41910" bIns="41910" numCol="1" spcCol="1270" anchor="ctr" anchorCtr="0">
           <a:noAutofit/>
         </a:bodyPr>
         <a:lstStyle/>
         <a:p>
-          <a:pPr lvl="0" algn="ctr" defTabSz="533400">
+          <a:pPr lvl="0" algn="ctr" defTabSz="488950">
             <a:lnSpc>
               <a:spcPct val="90000"/>
             </a:lnSpc>
@@ -1382,15 +1502,21 @@
             </a:spcAft>
           </a:pPr>
           <a:r>
-            <a:rPr lang="de-DE" sz="1200" kern="1200" dirty="0" smtClean="0"/>
+            <a:rPr lang="de-DE" sz="1100" kern="1200" dirty="0" smtClean="0">
+              <a:latin typeface="Univers CE 45 Light"/>
+              <a:cs typeface="Univers CE 45 Light"/>
+            </a:rPr>
             <a:t>(1) Diagramm nimmt ein berechnetes Layout an</a:t>
           </a:r>
-          <a:endParaRPr lang="de-DE" sz="1200" kern="1200" dirty="0"/>
+          <a:endParaRPr lang="de-DE" sz="1100" kern="1200" dirty="0">
+            <a:latin typeface="Univers CE 45 Light"/>
+            <a:cs typeface="Univers CE 45 Light"/>
+          </a:endParaRPr>
         </a:p>
       </dsp:txBody>
       <dsp:txXfrm>
-        <a:off x="2620548" y="42980"/>
-        <a:ext cx="1605937" cy="761759"/>
+        <a:off x="2560671" y="44991"/>
+        <a:ext cx="1710879" cy="811537"/>
       </dsp:txXfrm>
     </dsp:sp>
     <dsp:sp modelId="{C7346C2A-C3FD-8E43-B9C5-1A78E9A802D7}">
@@ -1400,86 +1526,55 @@
       </dsp:nvSpPr>
       <dsp:spPr>
         <a:xfrm>
-          <a:off x="4158483" y="913490"/>
-          <a:ext cx="1688355" cy="844177"/>
+          <a:off x="4205465" y="1179176"/>
+          <a:ext cx="1828308" cy="939101"/>
         </a:xfrm>
         <a:prstGeom prst="roundRect">
           <a:avLst/>
         </a:prstGeom>
-        <a:gradFill rotWithShape="0">
-          <a:gsLst>
-            <a:gs pos="0">
-              <a:schemeClr val="accent1">
-                <a:hueOff val="0"/>
-                <a:satOff val="0"/>
-                <a:lumOff val="0"/>
-                <a:alphaOff val="0"/>
-                <a:tint val="50000"/>
-                <a:satMod val="300000"/>
-              </a:schemeClr>
-            </a:gs>
-            <a:gs pos="35000">
-              <a:schemeClr val="accent1">
-                <a:hueOff val="0"/>
-                <a:satOff val="0"/>
-                <a:lumOff val="0"/>
-                <a:alphaOff val="0"/>
-                <a:tint val="37000"/>
-                <a:satMod val="300000"/>
-              </a:schemeClr>
-            </a:gs>
-            <a:gs pos="100000">
-              <a:schemeClr val="accent1">
-                <a:hueOff val="0"/>
-                <a:satOff val="0"/>
-                <a:lumOff val="0"/>
-                <a:alphaOff val="0"/>
-                <a:tint val="15000"/>
-                <a:satMod val="350000"/>
-              </a:schemeClr>
-            </a:gs>
-          </a:gsLst>
-          <a:lin ang="16200000" scaled="1"/>
-        </a:gradFill>
-        <a:ln>
-          <a:noFill/>
+        <a:solidFill>
+          <a:schemeClr val="lt1">
+            <a:hueOff val="0"/>
+            <a:satOff val="0"/>
+            <a:lumOff val="0"/>
+            <a:alphaOff val="0"/>
+          </a:schemeClr>
+        </a:solidFill>
+        <a:ln w="25400" cap="flat" cmpd="sng" algn="ctr">
+          <a:solidFill>
+            <a:schemeClr val="dk1">
+              <a:shade val="80000"/>
+              <a:hueOff val="0"/>
+              <a:satOff val="0"/>
+              <a:lumOff val="0"/>
+              <a:alphaOff val="0"/>
+            </a:schemeClr>
+          </a:solidFill>
+          <a:prstDash val="solid"/>
         </a:ln>
-        <a:effectLst>
-          <a:outerShdw blurRad="40000" dist="20000" dir="5400000" rotWithShape="0">
-            <a:srgbClr val="000000">
-              <a:alpha val="38000"/>
-            </a:srgbClr>
-          </a:outerShdw>
-        </a:effectLst>
-        <a:scene3d>
-          <a:camera prst="orthographicFront"/>
-          <a:lightRig rig="flat" dir="t"/>
-        </a:scene3d>
-        <a:sp3d prstMaterial="dkEdge">
-          <a:bevelT w="8200" h="38100"/>
-        </a:sp3d>
+        <a:effectLst/>
       </dsp:spPr>
       <dsp:style>
-        <a:lnRef idx="0">
+        <a:lnRef idx="2">
           <a:scrgbClr r="0" g="0" b="0"/>
         </a:lnRef>
-        <a:fillRef idx="2">
+        <a:fillRef idx="1">
           <a:scrgbClr r="0" g="0" b="0"/>
         </a:fillRef>
-        <a:effectRef idx="1">
+        <a:effectRef idx="0">
           <a:scrgbClr r="0" g="0" b="0"/>
         </a:effectRef>
         <a:fontRef idx="minor">
-          <a:schemeClr val="dk1"/>
+          <a:schemeClr val="lt1"/>
         </a:fontRef>
       </dsp:style>
       <dsp:txBody>
-        <a:bodyPr spcFirstLastPara="0" vert="horz" wrap="square" lIns="45720" tIns="45720" rIns="45720" bIns="45720" numCol="1" spcCol="1270" anchor="ctr" anchorCtr="0">
+        <a:bodyPr spcFirstLastPara="0" vert="horz" wrap="square" lIns="41910" tIns="41910" rIns="41910" bIns="41910" numCol="1" spcCol="1270" anchor="ctr" anchorCtr="0">
           <a:noAutofit/>
         </a:bodyPr>
         <a:lstStyle/>
         <a:p>
-          <a:pPr lvl="0" algn="ctr" defTabSz="533400">
+          <a:pPr lvl="0" algn="ctr" defTabSz="488950">
             <a:lnSpc>
               <a:spcPct val="90000"/>
             </a:lnSpc>
@@ -1491,15 +1586,21 @@
             </a:spcAft>
           </a:pPr>
           <a:r>
-            <a:rPr lang="de-DE" sz="1200" kern="1200" dirty="0" smtClean="0"/>
+            <a:rPr lang="de-DE" sz="1100" kern="1200" dirty="0" smtClean="0">
+              <a:latin typeface="Univers CE 45 Light"/>
+              <a:cs typeface="Univers CE 45 Light"/>
+            </a:rPr>
             <a:t>(2) Ausführung einer Bearbeitungsaktion durch den Nutzer</a:t>
           </a:r>
-          <a:endParaRPr lang="de-DE" sz="1200" kern="1200" dirty="0"/>
+          <a:endParaRPr lang="de-DE" sz="1100" kern="1200" dirty="0">
+            <a:latin typeface="Univers CE 45 Light"/>
+            <a:cs typeface="Univers CE 45 Light"/>
+          </a:endParaRPr>
         </a:p>
       </dsp:txBody>
       <dsp:txXfrm>
-        <a:off x="4199692" y="954699"/>
-        <a:ext cx="1605937" cy="761759"/>
+        <a:off x="4251308" y="1225019"/>
+        <a:ext cx="1736622" cy="847415"/>
       </dsp:txXfrm>
     </dsp:sp>
     <dsp:sp modelId="{FFE56FDF-7B20-5E4E-A446-13E3500AA863}">
@@ -1509,86 +1610,55 @@
       </dsp:nvSpPr>
       <dsp:spPr>
         <a:xfrm>
-          <a:off x="4158483" y="2736929"/>
-          <a:ext cx="1688355" cy="844177"/>
+          <a:off x="4208943" y="2685553"/>
+          <a:ext cx="1798683" cy="899341"/>
         </a:xfrm>
         <a:prstGeom prst="roundRect">
           <a:avLst/>
         </a:prstGeom>
-        <a:gradFill rotWithShape="0">
-          <a:gsLst>
-            <a:gs pos="0">
-              <a:schemeClr val="accent1">
-                <a:hueOff val="0"/>
-                <a:satOff val="0"/>
-                <a:lumOff val="0"/>
-                <a:alphaOff val="0"/>
-                <a:tint val="50000"/>
-                <a:satMod val="300000"/>
-              </a:schemeClr>
-            </a:gs>
-            <a:gs pos="35000">
-              <a:schemeClr val="accent1">
-                <a:hueOff val="0"/>
-                <a:satOff val="0"/>
-                <a:lumOff val="0"/>
-                <a:alphaOff val="0"/>
-                <a:tint val="37000"/>
-                <a:satMod val="300000"/>
-              </a:schemeClr>
-            </a:gs>
-            <a:gs pos="100000">
-              <a:schemeClr val="accent1">
-                <a:hueOff val="0"/>
-                <a:satOff val="0"/>
-                <a:lumOff val="0"/>
-                <a:alphaOff val="0"/>
-                <a:tint val="15000"/>
-                <a:satMod val="350000"/>
-              </a:schemeClr>
-            </a:gs>
-          </a:gsLst>
-          <a:lin ang="16200000" scaled="1"/>
-        </a:gradFill>
-        <a:ln>
-          <a:noFill/>
+        <a:solidFill>
+          <a:schemeClr val="lt1">
+            <a:hueOff val="0"/>
+            <a:satOff val="0"/>
+            <a:lumOff val="0"/>
+            <a:alphaOff val="0"/>
+          </a:schemeClr>
+        </a:solidFill>
+        <a:ln w="25400" cap="flat" cmpd="sng" algn="ctr">
+          <a:solidFill>
+            <a:schemeClr val="dk1">
+              <a:shade val="80000"/>
+              <a:hueOff val="0"/>
+              <a:satOff val="0"/>
+              <a:lumOff val="0"/>
+              <a:alphaOff val="0"/>
+            </a:schemeClr>
+          </a:solidFill>
+          <a:prstDash val="solid"/>
         </a:ln>
-        <a:effectLst>
-          <a:outerShdw blurRad="40000" dist="20000" dir="5400000" rotWithShape="0">
-            <a:srgbClr val="000000">
-              <a:alpha val="38000"/>
-            </a:srgbClr>
-          </a:outerShdw>
-        </a:effectLst>
-        <a:scene3d>
-          <a:camera prst="orthographicFront"/>
-          <a:lightRig rig="flat" dir="t"/>
-        </a:scene3d>
-        <a:sp3d prstMaterial="dkEdge">
-          <a:bevelT w="8200" h="38100"/>
-        </a:sp3d>
+        <a:effectLst/>
       </dsp:spPr>
       <dsp:style>
-        <a:lnRef idx="0">
+        <a:lnRef idx="2">
           <a:scrgbClr r="0" g="0" b="0"/>
         </a:lnRef>
-        <a:fillRef idx="2">
+        <a:fillRef idx="1">
           <a:scrgbClr r="0" g="0" b="0"/>
         </a:fillRef>
-        <a:effectRef idx="1">
+        <a:effectRef idx="0">
           <a:scrgbClr r="0" g="0" b="0"/>
         </a:effectRef>
         <a:fontRef idx="minor">
-          <a:schemeClr val="dk1"/>
+          <a:schemeClr val="lt1"/>
         </a:fontRef>
       </dsp:style>
       <dsp:txBody>
-        <a:bodyPr spcFirstLastPara="0" vert="horz" wrap="square" lIns="45720" tIns="45720" rIns="45720" bIns="45720" numCol="1" spcCol="1270" anchor="ctr" anchorCtr="0">
+        <a:bodyPr spcFirstLastPara="0" vert="horz" wrap="square" lIns="41910" tIns="41910" rIns="41910" bIns="41910" numCol="1" spcCol="1270" anchor="ctr" anchorCtr="0">
           <a:noAutofit/>
         </a:bodyPr>
         <a:lstStyle/>
         <a:p>
-          <a:pPr lvl="0" algn="ctr" defTabSz="533400">
+          <a:pPr lvl="0" algn="ctr" defTabSz="488950">
             <a:lnSpc>
               <a:spcPct val="90000"/>
             </a:lnSpc>
@@ -1600,14 +1670,17 @@
             </a:spcAft>
           </a:pPr>
           <a:r>
-            <a:rPr lang="de-DE" sz="1200" kern="1200" dirty="0" smtClean="0"/>
+            <a:rPr lang="de-DE" sz="1100" kern="1200" dirty="0" smtClean="0">
+              <a:latin typeface="Univers CE 45 Light"/>
+              <a:cs typeface="Univers CE 45 Light"/>
+            </a:rPr>
             <a:t>(3) Erzeugung eines Layout-Ereignisses</a:t>
           </a:r>
         </a:p>
       </dsp:txBody>
       <dsp:txXfrm>
-        <a:off x="4199692" y="2778138"/>
-        <a:ext cx="1605937" cy="761759"/>
+        <a:off x="4252845" y="2729455"/>
+        <a:ext cx="1710879" cy="811537"/>
       </dsp:txXfrm>
     </dsp:sp>
     <dsp:sp modelId="{562E43C6-D710-544D-A0BA-ECCA9DE1FAE8}">
@@ -1617,86 +1690,55 @@
       </dsp:nvSpPr>
       <dsp:spPr>
         <a:xfrm>
-          <a:off x="2579339" y="3648648"/>
-          <a:ext cx="1688355" cy="844177"/>
+          <a:off x="2516769" y="3882797"/>
+          <a:ext cx="1798683" cy="899341"/>
         </a:xfrm>
         <a:prstGeom prst="roundRect">
           <a:avLst/>
         </a:prstGeom>
-        <a:gradFill rotWithShape="0">
-          <a:gsLst>
-            <a:gs pos="0">
-              <a:schemeClr val="accent1">
-                <a:hueOff val="0"/>
-                <a:satOff val="0"/>
-                <a:lumOff val="0"/>
-                <a:alphaOff val="0"/>
-                <a:tint val="50000"/>
-                <a:satMod val="300000"/>
-              </a:schemeClr>
-            </a:gs>
-            <a:gs pos="35000">
-              <a:schemeClr val="accent1">
-                <a:hueOff val="0"/>
-                <a:satOff val="0"/>
-                <a:lumOff val="0"/>
-                <a:alphaOff val="0"/>
-                <a:tint val="37000"/>
-                <a:satMod val="300000"/>
-              </a:schemeClr>
-            </a:gs>
-            <a:gs pos="100000">
-              <a:schemeClr val="accent1">
-                <a:hueOff val="0"/>
-                <a:satOff val="0"/>
-                <a:lumOff val="0"/>
-                <a:alphaOff val="0"/>
-                <a:tint val="15000"/>
-                <a:satMod val="350000"/>
-              </a:schemeClr>
-            </a:gs>
-          </a:gsLst>
-          <a:lin ang="16200000" scaled="1"/>
-        </a:gradFill>
-        <a:ln>
-          <a:noFill/>
+        <a:solidFill>
+          <a:schemeClr val="lt1">
+            <a:hueOff val="0"/>
+            <a:satOff val="0"/>
+            <a:lumOff val="0"/>
+            <a:alphaOff val="0"/>
+          </a:schemeClr>
+        </a:solidFill>
+        <a:ln w="25400" cap="flat" cmpd="sng" algn="ctr">
+          <a:solidFill>
+            <a:schemeClr val="dk1">
+              <a:shade val="80000"/>
+              <a:hueOff val="0"/>
+              <a:satOff val="0"/>
+              <a:lumOff val="0"/>
+              <a:alphaOff val="0"/>
+            </a:schemeClr>
+          </a:solidFill>
+          <a:prstDash val="solid"/>
         </a:ln>
-        <a:effectLst>
-          <a:outerShdw blurRad="40000" dist="20000" dir="5400000" rotWithShape="0">
-            <a:srgbClr val="000000">
-              <a:alpha val="38000"/>
-            </a:srgbClr>
-          </a:outerShdw>
-        </a:effectLst>
-        <a:scene3d>
-          <a:camera prst="orthographicFront"/>
-          <a:lightRig rig="flat" dir="t"/>
-        </a:scene3d>
-        <a:sp3d prstMaterial="dkEdge">
-          <a:bevelT w="8200" h="38100"/>
-        </a:sp3d>
+        <a:effectLst/>
       </dsp:spPr>
       <dsp:style>
-        <a:lnRef idx="0">
+        <a:lnRef idx="2">
           <a:scrgbClr r="0" g="0" b="0"/>
         </a:lnRef>
-        <a:fillRef idx="2">
+        <a:fillRef idx="1">
           <a:scrgbClr r="0" g="0" b="0"/>
         </a:fillRef>
-        <a:effectRef idx="1">
+        <a:effectRef idx="0">
           <a:scrgbClr r="0" g="0" b="0"/>
         </a:effectRef>
         <a:fontRef idx="minor">
-          <a:schemeClr val="dk1"/>
+          <a:schemeClr val="lt1"/>
         </a:fontRef>
       </dsp:style>
       <dsp:txBody>
-        <a:bodyPr spcFirstLastPara="0" vert="horz" wrap="square" lIns="45720" tIns="45720" rIns="45720" bIns="45720" numCol="1" spcCol="1270" anchor="ctr" anchorCtr="0">
+        <a:bodyPr spcFirstLastPara="0" vert="horz" wrap="square" lIns="41910" tIns="41910" rIns="41910" bIns="41910" numCol="1" spcCol="1270" anchor="ctr" anchorCtr="0">
           <a:noAutofit/>
         </a:bodyPr>
         <a:lstStyle/>
         <a:p>
-          <a:pPr lvl="0" algn="ctr" defTabSz="533400">
+          <a:pPr lvl="0" algn="ctr" defTabSz="488950">
             <a:lnSpc>
               <a:spcPct val="90000"/>
             </a:lnSpc>
@@ -1708,15 +1750,21 @@
             </a:spcAft>
           </a:pPr>
           <a:r>
-            <a:rPr lang="de-DE" sz="1200" kern="1200" dirty="0" smtClean="0"/>
+            <a:rPr lang="de-DE" sz="1100" kern="1200" dirty="0" smtClean="0">
+              <a:latin typeface="Univers CE 45 Light"/>
+              <a:cs typeface="Univers CE 45 Light"/>
+            </a:rPr>
             <a:t>(4) Verarbeitung des Layout-Ereignisses durch die Layout-Engine</a:t>
           </a:r>
-          <a:endParaRPr lang="de-DE" sz="1200" kern="1200" dirty="0"/>
+          <a:endParaRPr lang="de-DE" sz="1100" kern="1200" dirty="0">
+            <a:latin typeface="Univers CE 45 Light"/>
+            <a:cs typeface="Univers CE 45 Light"/>
+          </a:endParaRPr>
         </a:p>
       </dsp:txBody>
       <dsp:txXfrm>
-        <a:off x="2620548" y="3689857"/>
-        <a:ext cx="1605937" cy="761759"/>
+        <a:off x="2560671" y="3926699"/>
+        <a:ext cx="1710879" cy="811537"/>
       </dsp:txXfrm>
     </dsp:sp>
     <dsp:sp modelId="{59DC55AD-0EAB-BC43-A0B9-0E9C3A0B5158}">
@@ -1726,86 +1774,55 @@
       </dsp:nvSpPr>
       <dsp:spPr>
         <a:xfrm>
-          <a:off x="1000195" y="2736929"/>
-          <a:ext cx="1688355" cy="844177"/>
+          <a:off x="847286" y="2685562"/>
+          <a:ext cx="1798683" cy="899341"/>
         </a:xfrm>
         <a:prstGeom prst="roundRect">
           <a:avLst/>
         </a:prstGeom>
-        <a:gradFill rotWithShape="0">
-          <a:gsLst>
-            <a:gs pos="0">
-              <a:schemeClr val="accent1">
-                <a:hueOff val="0"/>
-                <a:satOff val="0"/>
-                <a:lumOff val="0"/>
-                <a:alphaOff val="0"/>
-                <a:tint val="50000"/>
-                <a:satMod val="300000"/>
-              </a:schemeClr>
-            </a:gs>
-            <a:gs pos="35000">
-              <a:schemeClr val="accent1">
-                <a:hueOff val="0"/>
-                <a:satOff val="0"/>
-                <a:lumOff val="0"/>
-                <a:alphaOff val="0"/>
-                <a:tint val="37000"/>
-                <a:satMod val="300000"/>
-              </a:schemeClr>
-            </a:gs>
-            <a:gs pos="100000">
-              <a:schemeClr val="accent1">
-                <a:hueOff val="0"/>
-                <a:satOff val="0"/>
-                <a:lumOff val="0"/>
-                <a:alphaOff val="0"/>
-                <a:tint val="15000"/>
-                <a:satMod val="350000"/>
-              </a:schemeClr>
-            </a:gs>
-          </a:gsLst>
-          <a:lin ang="16200000" scaled="1"/>
-        </a:gradFill>
-        <a:ln>
-          <a:noFill/>
+        <a:solidFill>
+          <a:schemeClr val="lt1">
+            <a:hueOff val="0"/>
+            <a:satOff val="0"/>
+            <a:lumOff val="0"/>
+            <a:alphaOff val="0"/>
+          </a:schemeClr>
+        </a:solidFill>
+        <a:ln w="25400" cap="flat" cmpd="sng" algn="ctr">
+          <a:solidFill>
+            <a:schemeClr val="dk1">
+              <a:shade val="80000"/>
+              <a:hueOff val="0"/>
+              <a:satOff val="0"/>
+              <a:lumOff val="0"/>
+              <a:alphaOff val="0"/>
+            </a:schemeClr>
+          </a:solidFill>
+          <a:prstDash val="solid"/>
         </a:ln>
-        <a:effectLst>
-          <a:outerShdw blurRad="40000" dist="20000" dir="5400000" rotWithShape="0">
-            <a:srgbClr val="000000">
-              <a:alpha val="38000"/>
-            </a:srgbClr>
-          </a:outerShdw>
-        </a:effectLst>
-        <a:scene3d>
-          <a:camera prst="orthographicFront"/>
-          <a:lightRig rig="flat" dir="t"/>
-        </a:scene3d>
-        <a:sp3d prstMaterial="dkEdge">
-          <a:bevelT w="8200" h="38100"/>
-        </a:sp3d>
+        <a:effectLst/>
       </dsp:spPr>
       <dsp:style>
-        <a:lnRef idx="0">
+        <a:lnRef idx="2">
           <a:scrgbClr r="0" g="0" b="0"/>
         </a:lnRef>
-        <a:fillRef idx="2">
+        <a:fillRef idx="1">
           <a:scrgbClr r="0" g="0" b="0"/>
         </a:fillRef>
-        <a:effectRef idx="1">
+        <a:effectRef idx="0">
           <a:scrgbClr r="0" g="0" b="0"/>
         </a:effectRef>
         <a:fontRef idx="minor">
-          <a:schemeClr val="dk1"/>
+          <a:schemeClr val="lt1"/>
         </a:fontRef>
       </dsp:style>
       <dsp:txBody>
-        <a:bodyPr spcFirstLastPara="0" vert="horz" wrap="square" lIns="45720" tIns="45720" rIns="45720" bIns="45720" numCol="1" spcCol="1270" anchor="ctr" anchorCtr="0">
+        <a:bodyPr spcFirstLastPara="0" vert="horz" wrap="square" lIns="41910" tIns="41910" rIns="41910" bIns="41910" numCol="1" spcCol="1270" anchor="ctr" anchorCtr="0">
           <a:noAutofit/>
         </a:bodyPr>
         <a:lstStyle/>
         <a:p>
-          <a:pPr lvl="0" algn="ctr" defTabSz="533400">
+          <a:pPr lvl="0" algn="ctr" defTabSz="488950">
             <a:lnSpc>
               <a:spcPct val="90000"/>
             </a:lnSpc>
@@ -1817,15 +1834,21 @@
             </a:spcAft>
           </a:pPr>
           <a:r>
-            <a:rPr lang="de-DE" sz="1200" kern="1200" dirty="0" smtClean="0"/>
+            <a:rPr lang="de-DE" sz="1100" kern="1200" dirty="0" smtClean="0">
+              <a:latin typeface="Univers CE 45 Light"/>
+              <a:cs typeface="Univers CE 45 Light"/>
+            </a:rPr>
             <a:t>(5) Berechnung eines neuen Layouts</a:t>
           </a:r>
-          <a:endParaRPr lang="de-DE" sz="1200" kern="1200" dirty="0"/>
+          <a:endParaRPr lang="de-DE" sz="1100" kern="1200" dirty="0">
+            <a:latin typeface="Univers CE 45 Light"/>
+            <a:cs typeface="Univers CE 45 Light"/>
+          </a:endParaRPr>
         </a:p>
       </dsp:txBody>
       <dsp:txXfrm>
-        <a:off x="1041404" y="2778138"/>
-        <a:ext cx="1605937" cy="761759"/>
+        <a:off x="891188" y="2729464"/>
+        <a:ext cx="1710879" cy="811537"/>
       </dsp:txXfrm>
     </dsp:sp>
     <dsp:sp modelId="{D4D72BC1-EC95-9B41-BE0D-917E7A0F21C7}">
@@ -1835,86 +1858,55 @@
       </dsp:nvSpPr>
       <dsp:spPr>
         <a:xfrm>
-          <a:off x="1000195" y="913490"/>
-          <a:ext cx="1688355" cy="844177"/>
+          <a:off x="824610" y="1186986"/>
+          <a:ext cx="1798683" cy="899341"/>
         </a:xfrm>
         <a:prstGeom prst="roundRect">
           <a:avLst/>
         </a:prstGeom>
-        <a:gradFill rotWithShape="0">
-          <a:gsLst>
-            <a:gs pos="0">
-              <a:schemeClr val="accent1">
-                <a:hueOff val="0"/>
-                <a:satOff val="0"/>
-                <a:lumOff val="0"/>
-                <a:alphaOff val="0"/>
-                <a:tint val="50000"/>
-                <a:satMod val="300000"/>
-              </a:schemeClr>
-            </a:gs>
-            <a:gs pos="35000">
-              <a:schemeClr val="accent1">
-                <a:hueOff val="0"/>
-                <a:satOff val="0"/>
-                <a:lumOff val="0"/>
-                <a:alphaOff val="0"/>
-                <a:tint val="37000"/>
-                <a:satMod val="300000"/>
-              </a:schemeClr>
-            </a:gs>
-            <a:gs pos="100000">
-              <a:schemeClr val="accent1">
-                <a:hueOff val="0"/>
-                <a:satOff val="0"/>
-                <a:lumOff val="0"/>
-                <a:alphaOff val="0"/>
-                <a:tint val="15000"/>
-                <a:satMod val="350000"/>
-              </a:schemeClr>
-            </a:gs>
-          </a:gsLst>
-          <a:lin ang="16200000" scaled="1"/>
-        </a:gradFill>
-        <a:ln>
-          <a:noFill/>
+        <a:solidFill>
+          <a:schemeClr val="lt1">
+            <a:hueOff val="0"/>
+            <a:satOff val="0"/>
+            <a:lumOff val="0"/>
+            <a:alphaOff val="0"/>
+          </a:schemeClr>
+        </a:solidFill>
+        <a:ln w="25400" cap="flat" cmpd="sng" algn="ctr">
+          <a:solidFill>
+            <a:schemeClr val="dk1">
+              <a:shade val="80000"/>
+              <a:hueOff val="0"/>
+              <a:satOff val="0"/>
+              <a:lumOff val="0"/>
+              <a:alphaOff val="0"/>
+            </a:schemeClr>
+          </a:solidFill>
+          <a:prstDash val="solid"/>
         </a:ln>
-        <a:effectLst>
-          <a:outerShdw blurRad="40000" dist="20000" dir="5400000" rotWithShape="0">
-            <a:srgbClr val="000000">
-              <a:alpha val="38000"/>
-            </a:srgbClr>
-          </a:outerShdw>
-        </a:effectLst>
-        <a:scene3d>
-          <a:camera prst="orthographicFront"/>
-          <a:lightRig rig="flat" dir="t"/>
-        </a:scene3d>
-        <a:sp3d prstMaterial="dkEdge">
-          <a:bevelT w="8200" h="38100"/>
-        </a:sp3d>
+        <a:effectLst/>
       </dsp:spPr>
       <dsp:style>
-        <a:lnRef idx="0">
+        <a:lnRef idx="2">
           <a:scrgbClr r="0" g="0" b="0"/>
         </a:lnRef>
-        <a:fillRef idx="2">
+        <a:fillRef idx="1">
           <a:scrgbClr r="0" g="0" b="0"/>
         </a:fillRef>
-        <a:effectRef idx="1">
+        <a:effectRef idx="0">
           <a:scrgbClr r="0" g="0" b="0"/>
         </a:effectRef>
         <a:fontRef idx="minor">
-          <a:schemeClr val="dk1"/>
+          <a:schemeClr val="lt1"/>
         </a:fontRef>
       </dsp:style>
       <dsp:txBody>
-        <a:bodyPr spcFirstLastPara="0" vert="horz" wrap="square" lIns="45720" tIns="45720" rIns="45720" bIns="45720" numCol="1" spcCol="1270" anchor="ctr" anchorCtr="0">
+        <a:bodyPr spcFirstLastPara="0" vert="horz" wrap="square" lIns="41910" tIns="41910" rIns="41910" bIns="41910" numCol="1" spcCol="1270" anchor="ctr" anchorCtr="0">
           <a:noAutofit/>
         </a:bodyPr>
         <a:lstStyle/>
         <a:p>
-          <a:pPr lvl="0" algn="ctr" defTabSz="533400">
+          <a:pPr lvl="0" algn="ctr" defTabSz="488950">
             <a:lnSpc>
               <a:spcPct val="90000"/>
             </a:lnSpc>
@@ -1926,15 +1918,21 @@
             </a:spcAft>
           </a:pPr>
           <a:r>
-            <a:rPr lang="de-DE" sz="1200" kern="1200" dirty="0" smtClean="0"/>
+            <a:rPr lang="de-DE" sz="1100" kern="1200" dirty="0" smtClean="0">
+              <a:latin typeface="Univers CE 45 Light"/>
+              <a:cs typeface="Univers CE 45 Light"/>
+            </a:rPr>
             <a:t>(6) Anwendung des neuen Layouts auf das Diagramm mit Hilfe eines Layout-Übergangs</a:t>
           </a:r>
-          <a:endParaRPr lang="de-DE" sz="1200" kern="1200" dirty="0"/>
+          <a:endParaRPr lang="de-DE" sz="1100" kern="1200" dirty="0">
+            <a:latin typeface="Univers CE 45 Light"/>
+            <a:cs typeface="Univers CE 45 Light"/>
+          </a:endParaRPr>
         </a:p>
       </dsp:txBody>
       <dsp:txXfrm>
-        <a:off x="1041404" y="954699"/>
-        <a:ext cx="1605937" cy="761759"/>
+        <a:off x="868512" y="1230888"/>
+        <a:ext cx="1710879" cy="811537"/>
       </dsp:txXfrm>
     </dsp:sp>
   </dsp:spTree>
@@ -2345,11 +2343,11 @@
 </file>
 
 <file path=ppt/diagrams/quickStyle1.xml><?xml version="1.0" encoding="utf-8"?>
-<dgm:styleDef xmlns:dgm="http://schemas.openxmlformats.org/drawingml/2006/diagram" xmlns:a="http://schemas.openxmlformats.org/drawingml/2006/main" uniqueId="urn:microsoft.com/office/officeart/2005/8/quickstyle/simple3">
+<dgm:styleDef xmlns:dgm="http://schemas.openxmlformats.org/drawingml/2006/diagram" xmlns:a="http://schemas.openxmlformats.org/drawingml/2006/main" uniqueId="urn:microsoft.com/office/officeart/2005/8/quickstyle/simple1">
   <dgm:title val=""/>
   <dgm:desc val=""/>
   <dgm:catLst>
-    <dgm:cat type="simple" pri="10300"/>
+    <dgm:cat type="simple" pri="10100"/>
   </dgm:catLst>
   <dgm:scene3d>
     <a:camera prst="orthographicFront"/>
@@ -2358,65 +2356,59 @@
   <dgm:styleLbl name="node0">
     <dgm:scene3d>
       <a:camera prst="orthographicFront"/>
-      <a:lightRig rig="flat" dir="t"/>
+      <a:lightRig rig="threePt" dir="t"/>
     </dgm:scene3d>
-    <dgm:sp3d prstMaterial="dkEdge">
-      <a:bevelT w="8200" h="38100"/>
-    </dgm:sp3d>
+    <dgm:sp3d/>
     <dgm:txPr/>
     <dgm:style>
-      <a:lnRef idx="0">
+      <a:lnRef idx="2">
         <a:scrgbClr r="0" g="0" b="0"/>
       </a:lnRef>
-      <a:fillRef idx="2">
+      <a:fillRef idx="1">
         <a:scrgbClr r="0" g="0" b="0"/>
       </a:fillRef>
-      <a:effectRef idx="1">
+      <a:effectRef idx="0">
         <a:scrgbClr r="0" g="0" b="0"/>
       </a:effectRef>
       <a:fontRef idx="minor">
-        <a:schemeClr val="dk1"/>
+        <a:schemeClr val="lt1"/>
       </a:fontRef>
     </dgm:style>
   </dgm:styleLbl>
   <dgm:styleLbl name="lnNode1">
     <dgm:scene3d>
       <a:camera prst="orthographicFront"/>
-      <a:lightRig rig="flat" dir="t"/>
+      <a:lightRig rig="threePt" dir="t"/>
     </dgm:scene3d>
-    <dgm:sp3d prstMaterial="dkEdge">
-      <a:bevelT w="8200" h="38100"/>
-    </dgm:sp3d>
+    <dgm:sp3d/>
     <dgm:txPr/>
     <dgm:style>
-      <a:lnRef idx="1">
+      <a:lnRef idx="2">
         <a:scrgbClr r="0" g="0" b="0"/>
       </a:lnRef>
-      <a:fillRef idx="2">
+      <a:fillRef idx="1">
         <a:scrgbClr r="0" g="0" b="0"/>
       </a:fillRef>
       <a:effectRef idx="0">
         <a:scrgbClr r="0" g="0" b="0"/>
       </a:effectRef>
       <a:fontRef idx="minor">
-        <a:schemeClr val="dk1"/>
+        <a:schemeClr val="lt1"/>
       </a:fontRef>
     </dgm:style>
   </dgm:styleLbl>
   <dgm:styleLbl name="vennNode1">
     <dgm:scene3d>
       <a:camera prst="orthographicFront"/>
-      <a:lightRig rig="flat" dir="t"/>
+      <a:lightRig rig="threePt" dir="t"/>
     </dgm:scene3d>
-    <dgm:sp3d prstMaterial="dkEdge">
-      <a:bevelT w="8200" h="38100"/>
-    </dgm:sp3d>
+    <dgm:sp3d/>
     <dgm:txPr/>
     <dgm:style>
-      <a:lnRef idx="0">
+      <a:lnRef idx="2">
         <a:scrgbClr r="0" g="0" b="0"/>
       </a:lnRef>
-      <a:fillRef idx="2">
+      <a:fillRef idx="1">
         <a:scrgbClr r="0" g="0" b="0"/>
       </a:fillRef>
       <a:effectRef idx="0">
@@ -2435,113 +2427,105 @@
     <dgm:sp3d/>
     <dgm:txPr/>
     <dgm:style>
-      <a:lnRef idx="1">
+      <a:lnRef idx="2">
         <a:scrgbClr r="0" g="0" b="0"/>
       </a:lnRef>
-      <a:fillRef idx="2">
+      <a:fillRef idx="1">
         <a:scrgbClr r="0" g="0" b="0"/>
       </a:fillRef>
-      <a:effectRef idx="1">
+      <a:effectRef idx="0">
         <a:scrgbClr r="0" g="0" b="0"/>
       </a:effectRef>
       <a:fontRef idx="minor">
-        <a:schemeClr val="dk1"/>
+        <a:schemeClr val="lt1"/>
       </a:fontRef>
     </dgm:style>
   </dgm:styleLbl>
   <dgm:styleLbl name="node1">
     <dgm:scene3d>
       <a:camera prst="orthographicFront"/>
-      <a:lightRig rig="flat" dir="t"/>
+      <a:lightRig rig="threePt" dir="t"/>
     </dgm:scene3d>
-    <dgm:sp3d prstMaterial="dkEdge">
-      <a:bevelT w="8200" h="38100"/>
-    </dgm:sp3d>
+    <dgm:sp3d/>
     <dgm:txPr/>
     <dgm:style>
-      <a:lnRef idx="0">
+      <a:lnRef idx="2">
         <a:scrgbClr r="0" g="0" b="0"/>
       </a:lnRef>
-      <a:fillRef idx="2">
+      <a:fillRef idx="1">
         <a:scrgbClr r="0" g="0" b="0"/>
       </a:fillRef>
-      <a:effectRef idx="1">
+      <a:effectRef idx="0">
         <a:scrgbClr r="0" g="0" b="0"/>
       </a:effectRef>
       <a:fontRef idx="minor">
-        <a:schemeClr val="dk1"/>
+        <a:schemeClr val="lt1"/>
       </a:fontRef>
     </dgm:style>
   </dgm:styleLbl>
   <dgm:styleLbl name="node2">
     <dgm:scene3d>
       <a:camera prst="orthographicFront"/>
-      <a:lightRig rig="flat" dir="t"/>
+      <a:lightRig rig="threePt" dir="t"/>
     </dgm:scene3d>
-    <dgm:sp3d prstMaterial="dkEdge">
-      <a:bevelT w="8200" h="38100"/>
-    </dgm:sp3d>
+    <dgm:sp3d/>
     <dgm:txPr/>
     <dgm:style>
-      <a:lnRef idx="0">
+      <a:lnRef idx="2">
         <a:scrgbClr r="0" g="0" b="0"/>
       </a:lnRef>
-      <a:fillRef idx="2">
+      <a:fillRef idx="1">
         <a:scrgbClr r="0" g="0" b="0"/>
       </a:fillRef>
-      <a:effectRef idx="1">
+      <a:effectRef idx="0">
         <a:scrgbClr r="0" g="0" b="0"/>
       </a:effectRef>
       <a:fontRef idx="minor">
-        <a:schemeClr val="dk1"/>
+        <a:schemeClr val="lt1"/>
       </a:fontRef>
     </dgm:style>
   </dgm:styleLbl>
   <dgm:styleLbl name="node3">
     <dgm:scene3d>
       <a:camera prst="orthographicFront"/>
-      <a:lightRig rig="flat" dir="t"/>
+      <a:lightRig rig="threePt" dir="t"/>
     </dgm:scene3d>
-    <dgm:sp3d prstMaterial="dkEdge">
-      <a:bevelT w="8200" h="38100"/>
-    </dgm:sp3d>
+    <dgm:sp3d/>
     <dgm:txPr/>
     <dgm:style>
-      <a:lnRef idx="0">
+      <a:lnRef idx="2">
         <a:scrgbClr r="0" g="0" b="0"/>
       </a:lnRef>
-      <a:fillRef idx="2">
+      <a:fillRef idx="1">
         <a:scrgbClr r="0" g="0" b="0"/>
       </a:fillRef>
-      <a:effectRef idx="1">
+      <a:effectRef idx="0">
         <a:scrgbClr r="0" g="0" b="0"/>
       </a:effectRef>
       <a:fontRef idx="minor">
-        <a:schemeClr val="dk1"/>
+        <a:schemeClr val="lt1"/>
       </a:fontRef>
     </dgm:style>
   </dgm:styleLbl>
   <dgm:styleLbl name="node4">
     <dgm:scene3d>
       <a:camera prst="orthographicFront"/>
-      <a:lightRig rig="flat" dir="t"/>
+      <a:lightRig rig="threePt" dir="t"/>
     </dgm:scene3d>
-    <dgm:sp3d prstMaterial="dkEdge">
-      <a:bevelT w="8200" h="38100"/>
-    </dgm:sp3d>
+    <dgm:sp3d/>
     <dgm:txPr/>
     <dgm:style>
-      <a:lnRef idx="0">
+      <a:lnRef idx="2">
         <a:scrgbClr r="0" g="0" b="0"/>
       </a:lnRef>
-      <a:fillRef idx="2">
+      <a:fillRef idx="1">
         <a:scrgbClr r="0" g="0" b="0"/>
       </a:fillRef>
-      <a:effectRef idx="1">
+      <a:effectRef idx="0">
         <a:scrgbClr r="0" g="0" b="0"/>
       </a:effectRef>
       <a:fontRef idx="minor">
-        <a:schemeClr val="dk1"/>
+        <a:schemeClr val="lt1"/>
       </a:fontRef>
     </dgm:style>
   </dgm:styleLbl>
@@ -2553,13 +2537,13 @@
     <dgm:sp3d/>
     <dgm:txPr/>
     <dgm:style>
-      <a:lnRef idx="1">
+      <a:lnRef idx="2">
         <a:scrgbClr r="0" g="0" b="0"/>
       </a:lnRef>
       <a:fillRef idx="1">
         <a:scrgbClr r="0" g="0" b="0"/>
       </a:fillRef>
-      <a:effectRef idx="1">
+      <a:effectRef idx="0">
         <a:scrgbClr r="0" g="0" b="0"/>
       </a:effectRef>
       <a:fontRef idx="minor"/>
@@ -2573,13 +2557,13 @@
     <dgm:sp3d/>
     <dgm:txPr/>
     <dgm:style>
-      <a:lnRef idx="1">
+      <a:lnRef idx="2">
         <a:scrgbClr r="0" g="0" b="0"/>
       </a:lnRef>
       <a:fillRef idx="1">
         <a:scrgbClr r="0" g="0" b="0"/>
       </a:fillRef>
-      <a:effectRef idx="1">
+      <a:effectRef idx="0">
         <a:scrgbClr r="0" g="0" b="0"/>
       </a:effectRef>
       <a:fontRef idx="minor"/>
@@ -2593,13 +2577,13 @@
     <dgm:sp3d/>
     <dgm:txPr/>
     <dgm:style>
-      <a:lnRef idx="1">
+      <a:lnRef idx="2">
         <a:scrgbClr r="0" g="0" b="0"/>
       </a:lnRef>
       <a:fillRef idx="1">
         <a:scrgbClr r="0" g="0" b="0"/>
       </a:fillRef>
-      <a:effectRef idx="1">
+      <a:effectRef idx="0">
         <a:scrgbClr r="0" g="0" b="0"/>
       </a:effectRef>
       <a:fontRef idx="minor"/>
@@ -2616,14 +2600,14 @@
       <a:lnRef idx="0">
         <a:scrgbClr r="0" g="0" b="0"/>
       </a:lnRef>
-      <a:fillRef idx="2">
+      <a:fillRef idx="1">
         <a:scrgbClr r="0" g="0" b="0"/>
       </a:fillRef>
-      <a:effectRef idx="1">
+      <a:effectRef idx="0">
         <a:scrgbClr r="0" g="0" b="0"/>
       </a:effectRef>
       <a:fontRef idx="minor">
-        <a:schemeClr val="dk1"/>
+        <a:schemeClr val="lt1"/>
       </a:fontRef>
     </dgm:style>
   </dgm:styleLbl>
@@ -2638,14 +2622,14 @@
       <a:lnRef idx="0">
         <a:scrgbClr r="0" g="0" b="0"/>
       </a:lnRef>
-      <a:fillRef idx="2">
+      <a:fillRef idx="1">
         <a:scrgbClr r="0" g="0" b="0"/>
       </a:fillRef>
-      <a:effectRef idx="1">
+      <a:effectRef idx="0">
         <a:scrgbClr r="0" g="0" b="0"/>
       </a:effectRef>
       <a:fontRef idx="minor">
-        <a:schemeClr val="dk1"/>
+        <a:schemeClr val="lt1"/>
       </a:fontRef>
     </dgm:style>
   </dgm:styleLbl>
@@ -2660,14 +2644,14 @@
       <a:lnRef idx="0">
         <a:scrgbClr r="0" g="0" b="0"/>
       </a:lnRef>
-      <a:fillRef idx="2">
+      <a:fillRef idx="1">
         <a:scrgbClr r="0" g="0" b="0"/>
       </a:fillRef>
-      <a:effectRef idx="1">
+      <a:effectRef idx="0">
         <a:scrgbClr r="0" g="0" b="0"/>
       </a:effectRef>
       <a:fontRef idx="minor">
-        <a:schemeClr val="dk1"/>
+        <a:schemeClr val="lt1"/>
       </a:fontRef>
     </dgm:style>
   </dgm:styleLbl>
@@ -2699,13 +2683,13 @@
     <dgm:sp3d/>
     <dgm:txPr/>
     <dgm:style>
-      <a:lnRef idx="1">
+      <a:lnRef idx="2">
         <a:scrgbClr r="0" g="0" b="0"/>
       </a:lnRef>
-      <a:fillRef idx="2">
+      <a:fillRef idx="1">
         <a:scrgbClr r="0" g="0" b="0"/>
       </a:fillRef>
-      <a:effectRef idx="1">
+      <a:effectRef idx="0">
         <a:scrgbClr r="0" g="0" b="0"/>
       </a:effectRef>
       <a:fontRef idx="minor"/>
@@ -2714,120 +2698,110 @@
   <dgm:styleLbl name="asst0">
     <dgm:scene3d>
       <a:camera prst="orthographicFront"/>
-      <a:lightRig rig="flat" dir="t"/>
+      <a:lightRig rig="threePt" dir="t"/>
     </dgm:scene3d>
-    <dgm:sp3d prstMaterial="dkEdge">
-      <a:bevelT w="8200" h="38100"/>
-    </dgm:sp3d>
+    <dgm:sp3d/>
     <dgm:txPr/>
     <dgm:style>
-      <a:lnRef idx="0">
+      <a:lnRef idx="2">
         <a:scrgbClr r="0" g="0" b="0"/>
       </a:lnRef>
-      <a:fillRef idx="2">
+      <a:fillRef idx="1">
         <a:scrgbClr r="0" g="0" b="0"/>
       </a:fillRef>
-      <a:effectRef idx="1">
+      <a:effectRef idx="0">
         <a:scrgbClr r="0" g="0" b="0"/>
       </a:effectRef>
       <a:fontRef idx="minor">
-        <a:schemeClr val="dk1"/>
+        <a:schemeClr val="lt1"/>
       </a:fontRef>
     </dgm:style>
   </dgm:styleLbl>
   <dgm:styleLbl name="asst1">
     <dgm:scene3d>
       <a:camera prst="orthographicFront"/>
-      <a:lightRig rig="flat" dir="t"/>
+      <a:lightRig rig="threePt" dir="t"/>
     </dgm:scene3d>
-    <dgm:sp3d prstMaterial="dkEdge">
-      <a:bevelT w="8200" h="38100"/>
-    </dgm:sp3d>
+    <dgm:sp3d/>
     <dgm:txPr/>
     <dgm:style>
-      <a:lnRef idx="0">
+      <a:lnRef idx="2">
         <a:scrgbClr r="0" g="0" b="0"/>
       </a:lnRef>
-      <a:fillRef idx="2">
+      <a:fillRef idx="1">
         <a:scrgbClr r="0" g="0" b="0"/>
       </a:fillRef>
-      <a:effectRef idx="1">
+      <a:effectRef idx="0">
         <a:scrgbClr r="0" g="0" b="0"/>
       </a:effectRef>
       <a:fontRef idx="minor">
-        <a:schemeClr val="dk1"/>
+        <a:schemeClr val="lt1"/>
       </a:fontRef>
     </dgm:style>
   </dgm:styleLbl>
   <dgm:styleLbl name="asst2">
     <dgm:scene3d>
       <a:camera prst="orthographicFront"/>
-      <a:lightRig rig="flat" dir="t"/>
+      <a:lightRig rig="threePt" dir="t"/>
     </dgm:scene3d>
-    <dgm:sp3d prstMaterial="dkEdge">
-      <a:bevelT w="8200" h="38100"/>
-    </dgm:sp3d>
+    <dgm:sp3d/>
     <dgm:txPr/>
     <dgm:style>
-      <a:lnRef idx="0">
+      <a:lnRef idx="2">
         <a:scrgbClr r="0" g="0" b="0"/>
       </a:lnRef>
-      <a:fillRef idx="2">
+      <a:fillRef idx="1">
         <a:scrgbClr r="0" g="0" b="0"/>
       </a:fillRef>
-      <a:effectRef idx="1">
+      <a:effectRef idx="0">
         <a:scrgbClr r="0" g="0" b="0"/>
       </a:effectRef>
       <a:fontRef idx="minor">
-        <a:schemeClr val="dk1"/>
+        <a:schemeClr val="lt1"/>
       </a:fontRef>
     </dgm:style>
   </dgm:styleLbl>
   <dgm:styleLbl name="asst3">
     <dgm:scene3d>
       <a:camera prst="orthographicFront"/>
-      <a:lightRig rig="flat" dir="t"/>
+      <a:lightRig rig="threePt" dir="t"/>
     </dgm:scene3d>
-    <dgm:sp3d prstMaterial="dkEdge">
-      <a:bevelT w="8200" h="38100"/>
-    </dgm:sp3d>
+    <dgm:sp3d/>
     <dgm:txPr/>
     <dgm:style>
-      <a:lnRef idx="0">
+      <a:lnRef idx="2">
         <a:scrgbClr r="0" g="0" b="0"/>
       </a:lnRef>
-      <a:fillRef idx="2">
+      <a:fillRef idx="1">
         <a:scrgbClr r="0" g="0" b="0"/>
       </a:fillRef>
-      <a:effectRef idx="1">
+      <a:effectRef idx="0">
         <a:scrgbClr r="0" g="0" b="0"/>
       </a:effectRef>
       <a:fontRef idx="minor">
-        <a:schemeClr val="dk1"/>
+        <a:schemeClr val="lt1"/>
       </a:fontRef>
     </dgm:style>
   </dgm:styleLbl>
   <dgm:styleLbl name="asst4">
     <dgm:scene3d>
       <a:camera prst="orthographicFront"/>
-      <a:lightRig rig="flat" dir="t"/>
+      <a:lightRig rig="threePt" dir="t"/>
     </dgm:scene3d>
-    <dgm:sp3d prstMaterial="dkEdge">
-      <a:bevelT w="8200" h="38100"/>
-    </dgm:sp3d>
+    <dgm:sp3d/>
     <dgm:txPr/>
     <dgm:style>
-      <a:lnRef idx="0">
+      <a:lnRef idx="2">
         <a:scrgbClr r="0" g="0" b="0"/>
       </a:lnRef>
-      <a:fillRef idx="2">
+      <a:fillRef idx="1">
         <a:scrgbClr r="0" g="0" b="0"/>
       </a:fillRef>
-      <a:effectRef idx="1">
+      <a:effectRef idx="0">
         <a:scrgbClr r="0" g="0" b="0"/>
       </a:effectRef>
       <a:fontRef idx="minor">
-        <a:schemeClr val="dk1"/>
+        <a:schemeClr val="lt1"/>
       </a:fontRef>
     </dgm:style>
   </dgm:styleLbl>
@@ -2839,17 +2813,17 @@
     <dgm:sp3d/>
     <dgm:txPr/>
     <dgm:style>
-      <a:lnRef idx="1">
+      <a:lnRef idx="2">
         <a:scrgbClr r="0" g="0" b="0"/>
       </a:lnRef>
-      <a:fillRef idx="2">
+      <a:fillRef idx="1">
         <a:scrgbClr r="0" g="0" b="0"/>
       </a:fillRef>
-      <a:effectRef idx="1">
+      <a:effectRef idx="0">
         <a:scrgbClr r="0" g="0" b="0"/>
       </a:effectRef>
       <a:fontRef idx="minor">
-        <a:schemeClr val="dk1"/>
+        <a:schemeClr val="lt1"/>
       </a:fontRef>
     </dgm:style>
   </dgm:styleLbl>
@@ -2861,17 +2835,17 @@
     <dgm:sp3d/>
     <dgm:txPr/>
     <dgm:style>
-      <a:lnRef idx="1">
+      <a:lnRef idx="2">
         <a:scrgbClr r="0" g="0" b="0"/>
       </a:lnRef>
-      <a:fillRef idx="2">
+      <a:fillRef idx="1">
         <a:scrgbClr r="0" g="0" b="0"/>
       </a:fillRef>
-      <a:effectRef idx="1">
+      <a:effectRef idx="0">
         <a:scrgbClr r="0" g="0" b="0"/>
       </a:effectRef>
       <a:fontRef idx="minor">
-        <a:schemeClr val="dk1"/>
+        <a:schemeClr val="lt1"/>
       </a:fontRef>
     </dgm:style>
   </dgm:styleLbl>
@@ -2883,17 +2857,17 @@
     <dgm:sp3d/>
     <dgm:txPr/>
     <dgm:style>
-      <a:lnRef idx="1">
+      <a:lnRef idx="2">
         <a:scrgbClr r="0" g="0" b="0"/>
       </a:lnRef>
-      <a:fillRef idx="2">
+      <a:fillRef idx="1">
         <a:scrgbClr r="0" g="0" b="0"/>
       </a:fillRef>
-      <a:effectRef idx="1">
+      <a:effectRef idx="0">
         <a:scrgbClr r="0" g="0" b="0"/>
       </a:effectRef>
       <a:fontRef idx="minor">
-        <a:schemeClr val="dk1"/>
+        <a:schemeClr val="lt1"/>
       </a:fontRef>
     </dgm:style>
   </dgm:styleLbl>
@@ -2905,17 +2879,17 @@
     <dgm:sp3d/>
     <dgm:txPr/>
     <dgm:style>
-      <a:lnRef idx="1">
+      <a:lnRef idx="2">
         <a:scrgbClr r="0" g="0" b="0"/>
       </a:lnRef>
-      <a:fillRef idx="2">
+      <a:fillRef idx="1">
         <a:scrgbClr r="0" g="0" b="0"/>
       </a:fillRef>
-      <a:effectRef idx="1">
+      <a:effectRef idx="0">
         <a:scrgbClr r="0" g="0" b="0"/>
       </a:effectRef>
       <a:fontRef idx="minor">
-        <a:schemeClr val="dk1"/>
+        <a:schemeClr val="lt1"/>
       </a:fontRef>
     </dgm:style>
   </dgm:styleLbl>
@@ -3007,7 +2981,7 @@
     <dgm:sp3d/>
     <dgm:txPr/>
     <dgm:style>
-      <a:lnRef idx="1">
+      <a:lnRef idx="2">
         <a:scrgbClr r="0" g="0" b="0"/>
       </a:lnRef>
       <a:fillRef idx="1">
@@ -3027,7 +3001,7 @@
     <dgm:sp3d/>
     <dgm:txPr/>
     <dgm:style>
-      <a:lnRef idx="1">
+      <a:lnRef idx="2">
         <a:scrgbClr r="0" g="0" b="0"/>
       </a:lnRef>
       <a:fillRef idx="1">
@@ -3047,7 +3021,7 @@
     <dgm:sp3d/>
     <dgm:txPr/>
     <dgm:style>
-      <a:lnRef idx="1">
+      <a:lnRef idx="2">
         <a:scrgbClr r="0" g="0" b="0"/>
       </a:lnRef>
       <a:fillRef idx="1">
@@ -3087,7 +3061,7 @@
     <dgm:sp3d/>
     <dgm:txPr/>
     <dgm:style>
-      <a:lnRef idx="1">
+      <a:lnRef idx="2">
         <a:scrgbClr r="0" g="0" b="0"/>
       </a:lnRef>
       <a:fillRef idx="1">
@@ -3107,10 +3081,10 @@
     <dgm:sp3d/>
     <dgm:txPr/>
     <dgm:style>
-      <a:lnRef idx="1">
+      <a:lnRef idx="2">
         <a:scrgbClr r="0" g="0" b="0"/>
       </a:lnRef>
-      <a:fillRef idx="2">
+      <a:fillRef idx="1">
         <a:scrgbClr r="0" g="0" b="0"/>
       </a:fillRef>
       <a:effectRef idx="0">
@@ -3127,7 +3101,7 @@
     <dgm:sp3d/>
     <dgm:txPr/>
     <dgm:style>
-      <a:lnRef idx="1">
+      <a:lnRef idx="2">
         <a:scrgbClr r="0" g="0" b="0"/>
       </a:lnRef>
       <a:fillRef idx="1">
@@ -3147,7 +3121,7 @@
     <dgm:sp3d/>
     <dgm:txPr/>
     <dgm:style>
-      <a:lnRef idx="1">
+      <a:lnRef idx="2">
         <a:scrgbClr r="0" g="0" b="0"/>
       </a:lnRef>
       <a:fillRef idx="1">
@@ -3167,7 +3141,7 @@
     <dgm:sp3d/>
     <dgm:txPr/>
     <dgm:style>
-      <a:lnRef idx="1">
+      <a:lnRef idx="2">
         <a:scrgbClr r="0" g="0" b="0"/>
       </a:lnRef>
       <a:fillRef idx="1">
@@ -3187,7 +3161,7 @@
     <dgm:sp3d/>
     <dgm:txPr/>
     <dgm:style>
-      <a:lnRef idx="1">
+      <a:lnRef idx="2">
         <a:scrgbClr r="0" g="0" b="0"/>
       </a:lnRef>
       <a:fillRef idx="1">
@@ -3207,7 +3181,7 @@
     <dgm:sp3d/>
     <dgm:txPr/>
     <dgm:style>
-      <a:lnRef idx="1">
+      <a:lnRef idx="2">
         <a:scrgbClr r="0" g="0" b="0"/>
       </a:lnRef>
       <a:fillRef idx="1">
@@ -3227,7 +3201,7 @@
     <dgm:sp3d/>
     <dgm:txPr/>
     <dgm:style>
-      <a:lnRef idx="1">
+      <a:lnRef idx="2">
         <a:scrgbClr r="0" g="0" b="0"/>
       </a:lnRef>
       <a:fillRef idx="1">
@@ -3247,7 +3221,7 @@
     <dgm:sp3d/>
     <dgm:txPr/>
     <dgm:style>
-      <a:lnRef idx="1">
+      <a:lnRef idx="2">
         <a:scrgbClr r="0" g="0" b="0"/>
       </a:lnRef>
       <a:fillRef idx="1">
@@ -3267,7 +3241,7 @@
     <dgm:sp3d/>
     <dgm:txPr/>
     <dgm:style>
-      <a:lnRef idx="1">
+      <a:lnRef idx="2">
         <a:scrgbClr r="0" g="0" b="0"/>
       </a:lnRef>
       <a:fillRef idx="1">
@@ -3287,7 +3261,7 @@
     <dgm:sp3d/>
     <dgm:txPr/>
     <dgm:style>
-      <a:lnRef idx="1">
+      <a:lnRef idx="2">
         <a:scrgbClr r="0" g="0" b="0"/>
       </a:lnRef>
       <a:fillRef idx="1">
@@ -3313,7 +3287,7 @@
       <a:fillRef idx="1">
         <a:scrgbClr r="0" g="0" b="0"/>
       </a:fillRef>
-      <a:effectRef idx="1">
+      <a:effectRef idx="0">
         <a:scrgbClr r="0" g="0" b="0"/>
       </a:effectRef>
       <a:fontRef idx="minor"/>
@@ -3333,7 +3307,7 @@
       <a:fillRef idx="1">
         <a:scrgbClr r="0" g="0" b="0"/>
       </a:fillRef>
-      <a:effectRef idx="1">
+      <a:effectRef idx="0">
         <a:scrgbClr r="0" g="0" b="0"/>
       </a:effectRef>
       <a:fontRef idx="minor"/>
@@ -3362,20 +3336,18 @@
   <dgm:styleLbl name="fgShp">
     <dgm:scene3d>
       <a:camera prst="orthographicFront"/>
-      <a:lightRig rig="flat" dir="t"/>
+      <a:lightRig rig="threePt" dir="t"/>
     </dgm:scene3d>
-    <dgm:sp3d prstMaterial="dkEdge">
-      <a:bevelT w="8200" h="38100"/>
-    </dgm:sp3d>
+    <dgm:sp3d/>
     <dgm:txPr/>
     <dgm:style>
-      <a:lnRef idx="1">
+      <a:lnRef idx="2">
         <a:scrgbClr r="0" g="0" b="0"/>
       </a:lnRef>
-      <a:fillRef idx="2">
+      <a:fillRef idx="1">
         <a:scrgbClr r="0" g="0" b="0"/>
       </a:fillRef>
-      <a:effectRef idx="1">
+      <a:effectRef idx="0">
         <a:scrgbClr r="0" g="0" b="0"/>
       </a:effectRef>
       <a:fontRef idx="minor"/>
@@ -3585,7 +3557,7 @@
           <a:p>
             <a:fld id="{59939690-C1D6-1640-A1C3-AF33BDB3E088}" type="datetimeFigureOut">
               <a:rPr lang="de-DE" smtClean="0"/>
-              <a:t>03/10/14</a:t>
+              <a:t>04/10/14</a:t>
             </a:fld>
             <a:endParaRPr lang="de-DE"/>
           </a:p>
@@ -3755,7 +3727,7 @@
           <a:p>
             <a:fld id="{59939690-C1D6-1640-A1C3-AF33BDB3E088}" type="datetimeFigureOut">
               <a:rPr lang="de-DE" smtClean="0"/>
-              <a:t>03/10/14</a:t>
+              <a:t>04/10/14</a:t>
             </a:fld>
             <a:endParaRPr lang="de-DE"/>
           </a:p>
@@ -3935,7 +3907,7 @@
           <a:p>
             <a:fld id="{59939690-C1D6-1640-A1C3-AF33BDB3E088}" type="datetimeFigureOut">
               <a:rPr lang="de-DE" smtClean="0"/>
-              <a:t>03/10/14</a:t>
+              <a:t>04/10/14</a:t>
             </a:fld>
             <a:endParaRPr lang="de-DE"/>
           </a:p>
@@ -4105,7 +4077,7 @@
           <a:p>
             <a:fld id="{59939690-C1D6-1640-A1C3-AF33BDB3E088}" type="datetimeFigureOut">
               <a:rPr lang="de-DE" smtClean="0"/>
-              <a:t>03/10/14</a:t>
+              <a:t>04/10/14</a:t>
             </a:fld>
             <a:endParaRPr lang="de-DE"/>
           </a:p>
@@ -4351,7 +4323,7 @@
           <a:p>
             <a:fld id="{59939690-C1D6-1640-A1C3-AF33BDB3E088}" type="datetimeFigureOut">
               <a:rPr lang="de-DE" smtClean="0"/>
-              <a:t>03/10/14</a:t>
+              <a:t>04/10/14</a:t>
             </a:fld>
             <a:endParaRPr lang="de-DE"/>
           </a:p>
@@ -4639,7 +4611,7 @@
           <a:p>
             <a:fld id="{59939690-C1D6-1640-A1C3-AF33BDB3E088}" type="datetimeFigureOut">
               <a:rPr lang="de-DE" smtClean="0"/>
-              <a:t>03/10/14</a:t>
+              <a:t>04/10/14</a:t>
             </a:fld>
             <a:endParaRPr lang="de-DE"/>
           </a:p>
@@ -5061,7 +5033,7 @@
           <a:p>
             <a:fld id="{59939690-C1D6-1640-A1C3-AF33BDB3E088}" type="datetimeFigureOut">
               <a:rPr lang="de-DE" smtClean="0"/>
-              <a:t>03/10/14</a:t>
+              <a:t>04/10/14</a:t>
             </a:fld>
             <a:endParaRPr lang="de-DE"/>
           </a:p>
@@ -5179,7 +5151,7 @@
           <a:p>
             <a:fld id="{59939690-C1D6-1640-A1C3-AF33BDB3E088}" type="datetimeFigureOut">
               <a:rPr lang="de-DE" smtClean="0"/>
-              <a:t>03/10/14</a:t>
+              <a:t>04/10/14</a:t>
             </a:fld>
             <a:endParaRPr lang="de-DE"/>
           </a:p>
@@ -5274,7 +5246,7 @@
           <a:p>
             <a:fld id="{59939690-C1D6-1640-A1C3-AF33BDB3E088}" type="datetimeFigureOut">
               <a:rPr lang="de-DE" smtClean="0"/>
-              <a:t>03/10/14</a:t>
+              <a:t>04/10/14</a:t>
             </a:fld>
             <a:endParaRPr lang="de-DE"/>
           </a:p>
@@ -5551,7 +5523,7 @@
           <a:p>
             <a:fld id="{59939690-C1D6-1640-A1C3-AF33BDB3E088}" type="datetimeFigureOut">
               <a:rPr lang="de-DE" smtClean="0"/>
-              <a:t>03/10/14</a:t>
+              <a:t>04/10/14</a:t>
             </a:fld>
             <a:endParaRPr lang="de-DE"/>
           </a:p>
@@ -5804,7 +5776,7 @@
           <a:p>
             <a:fld id="{59939690-C1D6-1640-A1C3-AF33BDB3E088}" type="datetimeFigureOut">
               <a:rPr lang="de-DE" smtClean="0"/>
-              <a:t>03/10/14</a:t>
+              <a:t>04/10/14</a:t>
             </a:fld>
             <a:endParaRPr lang="de-DE"/>
           </a:p>
@@ -6017,7 +5989,7 @@
           <a:p>
             <a:fld id="{59939690-C1D6-1640-A1C3-AF33BDB3E088}" type="datetimeFigureOut">
               <a:rPr lang="de-DE" smtClean="0"/>
-              <a:t>03/10/14</a:t>
+              <a:t>04/10/14</a:t>
             </a:fld>
             <a:endParaRPr lang="de-DE"/>
           </a:p>
@@ -6399,14 +6371,14 @@
           <p:nvPr>
             <p:extLst>
               <p:ext uri="{D42A27DB-BD31-4B8C-83A1-F6EECF244321}">
-                <p14:modId xmlns:p14="http://schemas.microsoft.com/office/powerpoint/2010/main" val="3781329508"/>
+                <p14:modId xmlns:p14="http://schemas.microsoft.com/office/powerpoint/2010/main" val="3796459948"/>
               </p:ext>
             </p:extLst>
           </p:nvPr>
         </p:nvGraphicFramePr>
         <p:xfrm>
-          <a:off x="1012072" y="705440"/>
-          <a:ext cx="6847035" cy="4494598"/>
+          <a:off x="1012072" y="705439"/>
+          <a:ext cx="6847035" cy="4783229"/>
         </p:xfrm>
         <a:graphic>
           <a:graphicData uri="http://schemas.openxmlformats.org/drawingml/2006/diagram">

</xml_diff>